<commit_message>
Edited ppt and gant
</commit_message>
<xml_diff>
--- a/MVC.pptx
+++ b/MVC.pptx
@@ -1,15 +1,15 @@
 
 <file path=ppt/presentation.xml><?xml version="1.0" encoding="utf-8"?>
-<p:presentation xmlns:a="http://schemas.openxmlformats.org/drawingml/2006/main" xmlns:r="http://schemas.openxmlformats.org/officeDocument/2006/relationships" xmlns:p="http://schemas.openxmlformats.org/presentationml/2006/main" autoCompressPictures="0">
+<p:presentation xmlns:a="http://schemas.openxmlformats.org/drawingml/2006/main" xmlns:r="http://schemas.openxmlformats.org/officeDocument/2006/relationships" xmlns:p="http://schemas.openxmlformats.org/presentationml/2006/main" saveSubsetFonts="1" autoCompressPictures="0">
   <p:sldMasterIdLst>
     <p:sldMasterId id="2147483648" r:id="rId1"/>
   </p:sldMasterIdLst>
   <p:sldIdLst>
     <p:sldId id="256" r:id="rId2"/>
-    <p:sldId id="257" r:id="rId3"/>
-    <p:sldId id="258" r:id="rId4"/>
-    <p:sldId id="259" r:id="rId5"/>
-    <p:sldId id="260" r:id="rId6"/>
+    <p:sldId id="260" r:id="rId3"/>
+    <p:sldId id="259" r:id="rId4"/>
+    <p:sldId id="258" r:id="rId5"/>
+    <p:sldId id="257" r:id="rId6"/>
   </p:sldIdLst>
   <p:sldSz cx="12192000" cy="6858000"/>
   <p:notesSz cx="6858000" cy="9144000"/>
@@ -108,6 +108,11 @@
       </a:defRPr>
     </a:lvl9pPr>
   </p:defaultTextStyle>
+  <p:extLst>
+    <p:ext uri="{EFAFB233-063F-42B5-8137-9DF3F51BA10A}">
+      <p15:sldGuideLst xmlns:p15="http://schemas.microsoft.com/office/powerpoint/2012/main"/>
+    </p:ext>
+  </p:extLst>
 </p:presentation>
 </file>
 
@@ -1323,7 +1328,7 @@
             <a:fld id="{9334D819-9F07-4261-B09B-9E467E5D9002}" type="datetimeFigureOut">
               <a:rPr lang="en-US" dirty="0"/>
               <a:pPr/>
-              <a:t>10/18/2017</a:t>
+              <a:t>11/1/17</a:t>
             </a:fld>
             <a:endParaRPr lang="en-US" dirty="0"/>
           </a:p>
@@ -1557,7 +1562,7 @@
           <a:p>
             <a:fld id="{9334D819-9F07-4261-B09B-9E467E5D9002}" type="datetimeFigureOut">
               <a:rPr lang="en-US" dirty="0"/>
-              <a:t>10/18/2017</a:t>
+              <a:t>11/1/17</a:t>
             </a:fld>
             <a:endParaRPr lang="en-US" dirty="0"/>
           </a:p>
@@ -1732,7 +1737,7 @@
           <a:p>
             <a:fld id="{9334D819-9F07-4261-B09B-9E467E5D9002}" type="datetimeFigureOut">
               <a:rPr lang="en-US" dirty="0"/>
-              <a:t>10/18/2017</a:t>
+              <a:t>11/1/17</a:t>
             </a:fld>
             <a:endParaRPr lang="en-US" dirty="0"/>
           </a:p>
@@ -1897,7 +1902,7 @@
           <a:p>
             <a:fld id="{9334D819-9F07-4261-B09B-9E467E5D9002}" type="datetimeFigureOut">
               <a:rPr lang="en-US" dirty="0"/>
-              <a:t>10/18/2017</a:t>
+              <a:t>11/1/17</a:t>
             </a:fld>
             <a:endParaRPr lang="en-US" dirty="0"/>
           </a:p>
@@ -2169,7 +2174,7 @@
             <a:fld id="{9334D819-9F07-4261-B09B-9E467E5D9002}" type="datetimeFigureOut">
               <a:rPr lang="en-US" dirty="0"/>
               <a:pPr/>
-              <a:t>10/18/2017</a:t>
+              <a:t>11/1/17</a:t>
             </a:fld>
             <a:endParaRPr lang="en-US" dirty="0"/>
           </a:p>
@@ -3366,7 +3371,7 @@
           <a:p>
             <a:fld id="{9334D819-9F07-4261-B09B-9E467E5D9002}" type="datetimeFigureOut">
               <a:rPr lang="en-US" dirty="0"/>
-              <a:t>10/18/2017</a:t>
+              <a:t>11/1/17</a:t>
             </a:fld>
             <a:endParaRPr lang="en-US" dirty="0"/>
           </a:p>
@@ -3751,7 +3756,7 @@
           <a:p>
             <a:fld id="{9334D819-9F07-4261-B09B-9E467E5D9002}" type="datetimeFigureOut">
               <a:rPr lang="en-US" dirty="0"/>
-              <a:t>10/18/2017</a:t>
+              <a:t>11/1/17</a:t>
             </a:fld>
             <a:endParaRPr lang="en-US" dirty="0"/>
           </a:p>
@@ -3869,7 +3874,7 @@
           <a:p>
             <a:fld id="{9334D819-9F07-4261-B09B-9E467E5D9002}" type="datetimeFigureOut">
               <a:rPr lang="en-US" dirty="0"/>
-              <a:t>10/18/2017</a:t>
+              <a:t>11/1/17</a:t>
             </a:fld>
             <a:endParaRPr lang="en-US" dirty="0"/>
           </a:p>
@@ -3959,7 +3964,7 @@
           <a:p>
             <a:fld id="{9334D819-9F07-4261-B09B-9E467E5D9002}" type="datetimeFigureOut">
               <a:rPr lang="en-US" dirty="0"/>
-              <a:t>10/18/2017</a:t>
+              <a:t>11/1/17</a:t>
             </a:fld>
             <a:endParaRPr lang="en-US" dirty="0"/>
           </a:p>
@@ -4717,7 +4722,7 @@
           <a:p>
             <a:fld id="{9334D819-9F07-4261-B09B-9E467E5D9002}" type="datetimeFigureOut">
               <a:rPr lang="en-US" dirty="0"/>
-              <a:t>10/18/2017</a:t>
+              <a:t>11/1/17</a:t>
             </a:fld>
             <a:endParaRPr lang="en-US" dirty="0"/>
           </a:p>
@@ -5552,7 +5557,7 @@
           <a:p>
             <a:fld id="{9334D819-9F07-4261-B09B-9E467E5D9002}" type="datetimeFigureOut">
               <a:rPr lang="en-US" dirty="0"/>
-              <a:t>10/18/2017</a:t>
+              <a:t>11/1/17</a:t>
             </a:fld>
             <a:endParaRPr lang="en-US" dirty="0"/>
           </a:p>
@@ -5775,7 +5780,7 @@
             <a:fld id="{9334D819-9F07-4261-B09B-9E467E5D9002}" type="datetimeFigureOut">
               <a:rPr lang="en-US" dirty="0"/>
               <a:pPr/>
-              <a:t>10/18/2017</a:t>
+              <a:t>11/1/17</a:t>
             </a:fld>
             <a:endParaRPr lang="en-US" dirty="0"/>
           </a:p>
@@ -6775,7 +6780,7 @@
           <p:cNvPr id="2" name="Title 1">
             <a:extLst>
               <a:ext uri="{FF2B5EF4-FFF2-40B4-BE49-F238E27FC236}">
-                <a16:creationId xmlns:a16="http://schemas.microsoft.com/office/drawing/2014/main" id="{C6199E7C-29B1-46E2-9136-E11F1AE90A09}"/>
+                <a16:creationId xmlns:a16="http://schemas.microsoft.com/office/drawing/2014/main" xmlns="" id="{C6199E7C-29B1-46E2-9136-E11F1AE90A09}"/>
               </a:ext>
             </a:extLst>
           </p:cNvPr>
@@ -6803,7 +6808,7 @@
           <p:cNvPr id="3" name="Subtitle 2">
             <a:extLst>
               <a:ext uri="{FF2B5EF4-FFF2-40B4-BE49-F238E27FC236}">
-                <a16:creationId xmlns:a16="http://schemas.microsoft.com/office/drawing/2014/main" id="{CFC1C688-3386-4BA0-94F2-AB0AA5D503E4}"/>
+                <a16:creationId xmlns:a16="http://schemas.microsoft.com/office/drawing/2014/main" xmlns="" id="{CFC1C688-3386-4BA0-94F2-AB0AA5D503E4}"/>
               </a:ext>
             </a:extLst>
           </p:cNvPr>
@@ -6863,131 +6868,425 @@
       </p:grpSpPr>
       <p:sp>
         <p:nvSpPr>
-          <p:cNvPr id="2" name="Title 1">
+          <p:cNvPr id="13" name="Arrow: Curved Right 12">
             <a:extLst>
               <a:ext uri="{FF2B5EF4-FFF2-40B4-BE49-F238E27FC236}">
-                <a16:creationId xmlns:a16="http://schemas.microsoft.com/office/drawing/2014/main" id="{5ABBF08F-2582-4E09-8D8C-7775E33B85AD}"/>
+                <a16:creationId xmlns:a16="http://schemas.microsoft.com/office/drawing/2014/main" xmlns="" id="{9E8D8E94-1074-48E8-B571-F04AF75DF7FC}"/>
               </a:ext>
             </a:extLst>
           </p:cNvPr>
-          <p:cNvSpPr>
-            <a:spLocks noGrp="1"/>
-          </p:cNvSpPr>
-          <p:nvPr>
-            <p:ph type="title"/>
-          </p:nvPr>
+          <p:cNvSpPr/>
+          <p:nvPr/>
         </p:nvSpPr>
         <p:spPr>
-          <a:xfrm>
-            <a:off x="269507" y="544665"/>
-            <a:ext cx="7137133" cy="1196671"/>
+          <a:xfrm rot="963525">
+            <a:off x="4763220" y="1286298"/>
+            <a:ext cx="651005" cy="2065535"/>
           </a:xfrm>
+          <a:prstGeom prst="curvedRightArrow">
+            <a:avLst/>
+          </a:prstGeom>
         </p:spPr>
+        <p:style>
+          <a:lnRef idx="2">
+            <a:schemeClr val="accent1">
+              <a:shade val="50000"/>
+            </a:schemeClr>
+          </a:lnRef>
+          <a:fillRef idx="1">
+            <a:schemeClr val="accent1"/>
+          </a:fillRef>
+          <a:effectRef idx="0">
+            <a:schemeClr val="accent1"/>
+          </a:effectRef>
+          <a:fontRef idx="minor">
+            <a:schemeClr val="lt1"/>
+          </a:fontRef>
+        </p:style>
         <p:txBody>
-          <a:bodyPr>
-            <a:normAutofit/>
-          </a:bodyPr>
+          <a:bodyPr rtlCol="0" anchor="ctr"/>
           <a:lstStyle/>
           <a:p>
             <a:pPr algn="ctr"/>
-            <a:r>
-              <a:rPr lang="en-US" sz="5400" dirty="0"/>
-              <a:t>MODEL</a:t>
-            </a:r>
+            <a:endParaRPr lang="en-US">
+              <a:solidFill>
+                <a:schemeClr val="tx1"/>
+              </a:solidFill>
+            </a:endParaRPr>
           </a:p>
         </p:txBody>
       </p:sp>
       <p:sp>
         <p:nvSpPr>
-          <p:cNvPr id="4" name="Text Placeholder 3">
+          <p:cNvPr id="12" name="Arrow: Curved Left 11">
             <a:extLst>
               <a:ext uri="{FF2B5EF4-FFF2-40B4-BE49-F238E27FC236}">
-                <a16:creationId xmlns:a16="http://schemas.microsoft.com/office/drawing/2014/main" id="{9AEA9920-571F-42E4-A389-F16775334A8C}"/>
+                <a16:creationId xmlns:a16="http://schemas.microsoft.com/office/drawing/2014/main" xmlns="" id="{CCEA8BB3-EFD5-4EDC-A58E-6F27AC9F44DC}"/>
               </a:ext>
             </a:extLst>
           </p:cNvPr>
-          <p:cNvSpPr>
-            <a:spLocks noGrp="1"/>
-          </p:cNvSpPr>
-          <p:nvPr>
-            <p:ph type="body" sz="half" idx="2"/>
-          </p:nvPr>
+          <p:cNvSpPr/>
+          <p:nvPr/>
+        </p:nvSpPr>
+        <p:spPr>
+          <a:xfrm rot="19684834">
+            <a:off x="9333298" y="1180698"/>
+            <a:ext cx="697831" cy="2146433"/>
+          </a:xfrm>
+          <a:prstGeom prst="curvedLeftArrow">
+            <a:avLst/>
+          </a:prstGeom>
+        </p:spPr>
+        <p:style>
+          <a:lnRef idx="2">
+            <a:schemeClr val="accent1">
+              <a:shade val="50000"/>
+            </a:schemeClr>
+          </a:lnRef>
+          <a:fillRef idx="1">
+            <a:schemeClr val="accent1"/>
+          </a:fillRef>
+          <a:effectRef idx="0">
+            <a:schemeClr val="accent1"/>
+          </a:effectRef>
+          <a:fontRef idx="minor">
+            <a:schemeClr val="lt1"/>
+          </a:fontRef>
+        </p:style>
+        <p:txBody>
+          <a:bodyPr rtlCol="0" anchor="ctr"/>
+          <a:lstStyle/>
+          <a:p>
+            <a:pPr algn="ctr"/>
+            <a:endParaRPr lang="en-US">
+              <a:solidFill>
+                <a:schemeClr val="tx1"/>
+              </a:solidFill>
+            </a:endParaRPr>
+          </a:p>
+        </p:txBody>
+      </p:sp>
+      <p:sp>
+        <p:nvSpPr>
+          <p:cNvPr id="4" name="Rectangle: Rounded Corners 3">
+            <a:extLst>
+              <a:ext uri="{FF2B5EF4-FFF2-40B4-BE49-F238E27FC236}">
+                <a16:creationId xmlns:a16="http://schemas.microsoft.com/office/drawing/2014/main" xmlns="" id="{D34EBDAA-6E44-4CB0-9188-F0204E9EF15E}"/>
+              </a:ext>
+            </a:extLst>
+          </p:cNvPr>
+          <p:cNvSpPr/>
+          <p:nvPr/>
         </p:nvSpPr>
         <p:spPr>
           <a:xfrm>
-            <a:off x="2292015" y="2001218"/>
-            <a:ext cx="3092115" cy="4164164"/>
+            <a:off x="5548965" y="904775"/>
+            <a:ext cx="3859730" cy="1155032"/>
           </a:xfrm>
+          <a:prstGeom prst="roundRect">
+            <a:avLst/>
+          </a:prstGeom>
+        </p:spPr>
+        <p:style>
+          <a:lnRef idx="2">
+            <a:schemeClr val="accent1">
+              <a:shade val="50000"/>
+            </a:schemeClr>
+          </a:lnRef>
+          <a:fillRef idx="1">
+            <a:schemeClr val="accent1"/>
+          </a:fillRef>
+          <a:effectRef idx="0">
+            <a:schemeClr val="accent1"/>
+          </a:effectRef>
+          <a:fontRef idx="minor">
+            <a:schemeClr val="lt1"/>
+          </a:fontRef>
+        </p:style>
+        <p:txBody>
+          <a:bodyPr rot="0" spcFirstLastPara="0" vertOverflow="overflow" horzOverflow="overflow" vert="horz" wrap="square" lIns="91440" tIns="45720" rIns="91440" bIns="45720" numCol="1" spcCol="0" rtlCol="0" fromWordArt="0" anchor="ctr" anchorCtr="0" forceAA="0" compatLnSpc="1">
+            <a:prstTxWarp prst="textNoShape">
+              <a:avLst/>
+            </a:prstTxWarp>
+            <a:noAutofit/>
+          </a:bodyPr>
+          <a:lstStyle/>
+          <a:p>
+            <a:pPr algn="ctr"/>
+            <a:r>
+              <a:rPr lang="en-US" sz="3200" b="1" dirty="0">
+                <a:ln w="22225">
+                  <a:solidFill>
+                    <a:schemeClr val="accent2"/>
+                  </a:solidFill>
+                  <a:prstDash val="solid"/>
+                </a:ln>
+                <a:solidFill>
+                  <a:schemeClr val="accent2">
+                    <a:lumMod val="40000"/>
+                    <a:lumOff val="60000"/>
+                  </a:schemeClr>
+                </a:solidFill>
+              </a:rPr>
+              <a:t>CONTROLLER</a:t>
+            </a:r>
+          </a:p>
+        </p:txBody>
+      </p:sp>
+      <p:sp>
+        <p:nvSpPr>
+          <p:cNvPr id="5" name="Rectangle: Rounded Corners 4">
+            <a:extLst>
+              <a:ext uri="{FF2B5EF4-FFF2-40B4-BE49-F238E27FC236}">
+                <a16:creationId xmlns:a16="http://schemas.microsoft.com/office/drawing/2014/main" xmlns="" id="{5A069AE0-5359-47AE-9301-53690ECEBFDD}"/>
+              </a:ext>
+            </a:extLst>
+          </p:cNvPr>
+          <p:cNvSpPr/>
+          <p:nvPr/>
+        </p:nvSpPr>
+        <p:spPr>
+          <a:xfrm>
+            <a:off x="2982228" y="3283818"/>
+            <a:ext cx="3859730" cy="1155032"/>
+          </a:xfrm>
+          <a:prstGeom prst="roundRect">
+            <a:avLst/>
+          </a:prstGeom>
+        </p:spPr>
+        <p:style>
+          <a:lnRef idx="2">
+            <a:schemeClr val="accent1">
+              <a:shade val="50000"/>
+            </a:schemeClr>
+          </a:lnRef>
+          <a:fillRef idx="1">
+            <a:schemeClr val="accent1"/>
+          </a:fillRef>
+          <a:effectRef idx="0">
+            <a:schemeClr val="accent1"/>
+          </a:effectRef>
+          <a:fontRef idx="minor">
+            <a:schemeClr val="lt1"/>
+          </a:fontRef>
+        </p:style>
+        <p:txBody>
+          <a:bodyPr rtlCol="0" anchor="ctr"/>
+          <a:lstStyle/>
+          <a:p>
+            <a:pPr algn="ctr"/>
+            <a:r>
+              <a:rPr lang="en-US" sz="4800" b="1" dirty="0">
+                <a:ln w="22225">
+                  <a:solidFill>
+                    <a:schemeClr val="accent2"/>
+                  </a:solidFill>
+                  <a:prstDash val="solid"/>
+                </a:ln>
+                <a:solidFill>
+                  <a:schemeClr val="accent2">
+                    <a:lumMod val="40000"/>
+                    <a:lumOff val="60000"/>
+                  </a:schemeClr>
+                </a:solidFill>
+              </a:rPr>
+              <a:t>MODEL</a:t>
+            </a:r>
+            <a:endParaRPr lang="en-US" sz="4800" dirty="0"/>
+          </a:p>
+        </p:txBody>
+      </p:sp>
+      <p:sp>
+        <p:nvSpPr>
+          <p:cNvPr id="6" name="Rectangle: Rounded Corners 5">
+            <a:extLst>
+              <a:ext uri="{FF2B5EF4-FFF2-40B4-BE49-F238E27FC236}">
+                <a16:creationId xmlns:a16="http://schemas.microsoft.com/office/drawing/2014/main" xmlns="" id="{3A5E7BD6-B02F-4A84-A853-EFDA52B4C52F}"/>
+              </a:ext>
+            </a:extLst>
+          </p:cNvPr>
+          <p:cNvSpPr/>
+          <p:nvPr/>
+        </p:nvSpPr>
+        <p:spPr>
+          <a:xfrm>
+            <a:off x="8139765" y="3283818"/>
+            <a:ext cx="3859730" cy="1155032"/>
+          </a:xfrm>
+          <a:prstGeom prst="roundRect">
+            <a:avLst/>
+          </a:prstGeom>
+        </p:spPr>
+        <p:style>
+          <a:lnRef idx="2">
+            <a:schemeClr val="accent1">
+              <a:shade val="50000"/>
+            </a:schemeClr>
+          </a:lnRef>
+          <a:fillRef idx="1">
+            <a:schemeClr val="accent1"/>
+          </a:fillRef>
+          <a:effectRef idx="0">
+            <a:schemeClr val="accent1"/>
+          </a:effectRef>
+          <a:fontRef idx="minor">
+            <a:schemeClr val="lt1"/>
+          </a:fontRef>
+        </p:style>
+        <p:txBody>
+          <a:bodyPr rtlCol="0" anchor="ctr"/>
+          <a:lstStyle/>
+          <a:p>
+            <a:pPr algn="ctr"/>
+            <a:r>
+              <a:rPr lang="en-US" sz="4800" b="1" dirty="0">
+                <a:ln w="22225">
+                  <a:solidFill>
+                    <a:schemeClr val="accent2"/>
+                  </a:solidFill>
+                  <a:prstDash val="solid"/>
+                </a:ln>
+                <a:solidFill>
+                  <a:schemeClr val="accent2">
+                    <a:lumMod val="40000"/>
+                    <a:lumOff val="60000"/>
+                  </a:schemeClr>
+                </a:solidFill>
+              </a:rPr>
+              <a:t>VIEW</a:t>
+            </a:r>
+            <a:endParaRPr lang="en-US" sz="4800" dirty="0"/>
+          </a:p>
+        </p:txBody>
+      </p:sp>
+      <p:sp>
+        <p:nvSpPr>
+          <p:cNvPr id="9" name="Arrow: Up 8">
+            <a:extLst>
+              <a:ext uri="{FF2B5EF4-FFF2-40B4-BE49-F238E27FC236}">
+                <a16:creationId xmlns:a16="http://schemas.microsoft.com/office/drawing/2014/main" xmlns="" id="{2945D2A4-4237-4A37-A8C3-518DDF249A1C}"/>
+              </a:ext>
+            </a:extLst>
+          </p:cNvPr>
+          <p:cNvSpPr/>
+          <p:nvPr/>
+        </p:nvSpPr>
+        <p:spPr>
+          <a:xfrm>
+            <a:off x="6126480" y="2253915"/>
+            <a:ext cx="715478" cy="1029903"/>
+          </a:xfrm>
+          <a:prstGeom prst="upArrow">
+            <a:avLst/>
+          </a:prstGeom>
+        </p:spPr>
+        <p:style>
+          <a:lnRef idx="2">
+            <a:schemeClr val="accent1">
+              <a:shade val="50000"/>
+            </a:schemeClr>
+          </a:lnRef>
+          <a:fillRef idx="1">
+            <a:schemeClr val="accent1"/>
+          </a:fillRef>
+          <a:effectRef idx="0">
+            <a:schemeClr val="accent1"/>
+          </a:effectRef>
+          <a:fontRef idx="minor">
+            <a:schemeClr val="lt1"/>
+          </a:fontRef>
+        </p:style>
+        <p:txBody>
+          <a:bodyPr rtlCol="0" anchor="ctr"/>
+          <a:lstStyle/>
+          <a:p>
+            <a:pPr algn="ctr"/>
+            <a:endParaRPr lang="en-US"/>
+          </a:p>
+        </p:txBody>
+      </p:sp>
+      <p:sp>
+        <p:nvSpPr>
+          <p:cNvPr id="10" name="Arrow: Up 9">
+            <a:extLst>
+              <a:ext uri="{FF2B5EF4-FFF2-40B4-BE49-F238E27FC236}">
+                <a16:creationId xmlns:a16="http://schemas.microsoft.com/office/drawing/2014/main" xmlns="" id="{1CB8B7DB-8E8D-4B07-A9D4-D52BE6BC7360}"/>
+              </a:ext>
+            </a:extLst>
+          </p:cNvPr>
+          <p:cNvSpPr/>
+          <p:nvPr/>
+        </p:nvSpPr>
+        <p:spPr>
+          <a:xfrm>
+            <a:off x="8227996" y="2253915"/>
+            <a:ext cx="715478" cy="1029903"/>
+          </a:xfrm>
+          <a:prstGeom prst="upArrow">
+            <a:avLst/>
+          </a:prstGeom>
+        </p:spPr>
+        <p:style>
+          <a:lnRef idx="2">
+            <a:schemeClr val="accent1">
+              <a:shade val="50000"/>
+            </a:schemeClr>
+          </a:lnRef>
+          <a:fillRef idx="1">
+            <a:schemeClr val="accent1"/>
+          </a:fillRef>
+          <a:effectRef idx="0">
+            <a:schemeClr val="accent1"/>
+          </a:effectRef>
+          <a:fontRef idx="minor">
+            <a:schemeClr val="lt1"/>
+          </a:fontRef>
+        </p:style>
+        <p:txBody>
+          <a:bodyPr rtlCol="0" anchor="ctr"/>
+          <a:lstStyle/>
+          <a:p>
+            <a:pPr algn="ctr"/>
+            <a:endParaRPr lang="en-US"/>
+          </a:p>
+        </p:txBody>
+      </p:sp>
+      <p:sp>
+        <p:nvSpPr>
+          <p:cNvPr id="14" name="TextBox 13">
+            <a:extLst>
+              <a:ext uri="{FF2B5EF4-FFF2-40B4-BE49-F238E27FC236}">
+                <a16:creationId xmlns:a16="http://schemas.microsoft.com/office/drawing/2014/main" xmlns="" id="{FAB8EF5F-1EDE-4EF7-92D0-70D11B73813A}"/>
+              </a:ext>
+            </a:extLst>
+          </p:cNvPr>
+          <p:cNvSpPr txBox="1"/>
+          <p:nvPr/>
+        </p:nvSpPr>
+        <p:spPr>
+          <a:xfrm>
+            <a:off x="-77002" y="3056946"/>
+            <a:ext cx="2295625" cy="584775"/>
+          </a:xfrm>
+          <a:prstGeom prst="rect">
+            <a:avLst/>
+          </a:prstGeom>
+          <a:noFill/>
         </p:spPr>
         <p:txBody>
-          <a:bodyPr>
-            <a:normAutofit/>
+          <a:bodyPr wrap="square" rtlCol="0">
+            <a:spAutoFit/>
           </a:bodyPr>
           <a:lstStyle/>
           <a:p>
             <a:pPr algn="ctr"/>
             <a:r>
-              <a:rPr lang="en-US" sz="2800" u="sng" dirty="0">
+              <a:rPr lang="en-US" sz="3200" b="1" dirty="0">
                 <a:solidFill>
-                  <a:schemeClr val="tx1"/>
+                  <a:schemeClr val="bg2"/>
                 </a:solidFill>
               </a:rPr>
-              <a:t>MAIN CLASSES</a:t>
-            </a:r>
-          </a:p>
-          <a:p>
-            <a:pPr algn="ctr"/>
-            <a:r>
-              <a:rPr lang="en-US" sz="2000" dirty="0">
-                <a:solidFill>
-                  <a:schemeClr val="tx1"/>
-                </a:solidFill>
-              </a:rPr>
-              <a:t>Account</a:t>
-            </a:r>
-          </a:p>
-          <a:p>
-            <a:pPr algn="ctr"/>
-            <a:r>
-              <a:rPr lang="en-US" sz="2000" dirty="0">
-                <a:solidFill>
-                  <a:schemeClr val="tx1"/>
-                </a:solidFill>
-              </a:rPr>
-              <a:t>Transaction</a:t>
-            </a:r>
-          </a:p>
-          <a:p>
-            <a:pPr algn="ctr"/>
-            <a:r>
-              <a:rPr lang="en-US" sz="2000" dirty="0">
-                <a:solidFill>
-                  <a:schemeClr val="tx1"/>
-                </a:solidFill>
-              </a:rPr>
-              <a:t>Withdrawal</a:t>
-            </a:r>
-          </a:p>
-          <a:p>
-            <a:pPr algn="ctr"/>
-            <a:r>
-              <a:rPr lang="en-US" sz="2000" dirty="0">
-                <a:solidFill>
-                  <a:schemeClr val="tx1"/>
-                </a:solidFill>
-              </a:rPr>
-              <a:t>Deposit</a:t>
-            </a:r>
-          </a:p>
-          <a:p>
-            <a:pPr algn="ctr"/>
-            <a:r>
-              <a:rPr lang="en-US" sz="1800" dirty="0">
-                <a:solidFill>
-                  <a:schemeClr val="tx1"/>
-                </a:solidFill>
-              </a:rPr>
-              <a:t>(Not in code yet)</a:t>
+              <a:t>DIAGRAM</a:t>
             </a:r>
           </a:p>
         </p:txBody>
@@ -6995,7 +7294,7 @@
     </p:spTree>
     <p:extLst>
       <p:ext uri="{BB962C8B-B14F-4D97-AF65-F5344CB8AC3E}">
-        <p14:creationId xmlns:p14="http://schemas.microsoft.com/office/powerpoint/2010/main" val="919915019"/>
+        <p14:creationId xmlns:p14="http://schemas.microsoft.com/office/powerpoint/2010/main" val="3012431970"/>
       </p:ext>
     </p:extLst>
   </p:cSld>
@@ -7027,7 +7326,237 @@
           <p:cNvPr id="2" name="Title 1">
             <a:extLst>
               <a:ext uri="{FF2B5EF4-FFF2-40B4-BE49-F238E27FC236}">
-                <a16:creationId xmlns:a16="http://schemas.microsoft.com/office/drawing/2014/main" id="{4DF97F2A-1C61-45E1-8FFA-D92E98296125}"/>
+                <a16:creationId xmlns:a16="http://schemas.microsoft.com/office/drawing/2014/main" xmlns="" id="{CAE6CE5C-0172-40BB-8ED4-66C6F6FE3A68}"/>
+              </a:ext>
+            </a:extLst>
+          </p:cNvPr>
+          <p:cNvSpPr>
+            <a:spLocks noGrp="1"/>
+          </p:cNvSpPr>
+          <p:nvPr>
+            <p:ph type="title"/>
+          </p:nvPr>
+        </p:nvSpPr>
+        <p:spPr/>
+        <p:txBody>
+          <a:bodyPr>
+            <a:normAutofit/>
+          </a:bodyPr>
+          <a:lstStyle/>
+          <a:p>
+            <a:pPr algn="ctr"/>
+            <a:r>
+              <a:rPr lang="en-US" sz="5400" dirty="0"/>
+              <a:t>VIEW</a:t>
+            </a:r>
+          </a:p>
+        </p:txBody>
+      </p:sp>
+      <p:pic>
+        <p:nvPicPr>
+          <p:cNvPr id="6" name="Content Placeholder 5">
+            <a:extLst>
+              <a:ext uri="{FF2B5EF4-FFF2-40B4-BE49-F238E27FC236}">
+                <a16:creationId xmlns:a16="http://schemas.microsoft.com/office/drawing/2014/main" xmlns="" id="{0F89C3FC-69C7-44EB-B52F-97AFC9F0C0A6}"/>
+              </a:ext>
+            </a:extLst>
+          </p:cNvPr>
+          <p:cNvPicPr>
+            <a:picLocks noGrp="1" noChangeAspect="1"/>
+          </p:cNvPicPr>
+          <p:nvPr>
+            <p:ph idx="1"/>
+          </p:nvPr>
+        </p:nvPicPr>
+        <p:blipFill>
+          <a:blip r:embed="rId2"/>
+          <a:stretch>
+            <a:fillRect/>
+          </a:stretch>
+        </p:blipFill>
+        <p:spPr>
+          <a:xfrm>
+            <a:off x="1915428" y="1128208"/>
+            <a:ext cx="4045686" cy="5566162"/>
+          </a:xfrm>
+        </p:spPr>
+      </p:pic>
+      <p:sp>
+        <p:nvSpPr>
+          <p:cNvPr id="4" name="Text Placeholder 3">
+            <a:extLst>
+              <a:ext uri="{FF2B5EF4-FFF2-40B4-BE49-F238E27FC236}">
+                <a16:creationId xmlns:a16="http://schemas.microsoft.com/office/drawing/2014/main" xmlns="" id="{82EECC6E-BA75-4321-B49B-7DBAD34631F8}"/>
+              </a:ext>
+            </a:extLst>
+          </p:cNvPr>
+          <p:cNvSpPr>
+            <a:spLocks noGrp="1"/>
+          </p:cNvSpPr>
+          <p:nvPr>
+            <p:ph type="body" sz="half" idx="2"/>
+          </p:nvPr>
+        </p:nvSpPr>
+        <p:spPr>
+          <a:xfrm>
+            <a:off x="8337885" y="1741336"/>
+            <a:ext cx="3092115" cy="4750904"/>
+          </a:xfrm>
+        </p:spPr>
+        <p:txBody>
+          <a:bodyPr>
+            <a:normAutofit fontScale="92500" lnSpcReduction="20000"/>
+          </a:bodyPr>
+          <a:lstStyle/>
+          <a:p>
+            <a:pPr algn="ctr"/>
+            <a:r>
+              <a:rPr lang="en-US" sz="2800" u="sng" dirty="0"/>
+              <a:t>MAIN FRAME</a:t>
+            </a:r>
+          </a:p>
+          <a:p>
+            <a:pPr algn="ctr"/>
+            <a:r>
+              <a:rPr lang="en-US" sz="2800" u="sng" dirty="0"/>
+              <a:t>PANELS</a:t>
+            </a:r>
+          </a:p>
+          <a:p>
+            <a:pPr algn="ctr"/>
+            <a:r>
+              <a:rPr lang="en-US" sz="1800" dirty="0" err="1"/>
+              <a:t>LogInPanel</a:t>
+            </a:r>
+            <a:endParaRPr lang="en-US" sz="1800" dirty="0"/>
+          </a:p>
+          <a:p>
+            <a:pPr algn="ctr"/>
+            <a:r>
+              <a:rPr lang="en-US" sz="1800" dirty="0" err="1"/>
+              <a:t>HomePanel</a:t>
+            </a:r>
+            <a:endParaRPr lang="en-US" sz="1800" dirty="0"/>
+          </a:p>
+          <a:p>
+            <a:pPr algn="ctr"/>
+            <a:r>
+              <a:rPr lang="en-US" sz="1800" dirty="0" err="1"/>
+              <a:t>AccountPanel</a:t>
+            </a:r>
+            <a:endParaRPr lang="en-US" sz="1800" dirty="0"/>
+          </a:p>
+          <a:p>
+            <a:pPr algn="ctr"/>
+            <a:r>
+              <a:rPr lang="en-US" sz="1800" dirty="0"/>
+              <a:t>Etc.</a:t>
+            </a:r>
+          </a:p>
+          <a:p>
+            <a:pPr algn="ctr"/>
+            <a:r>
+              <a:rPr lang="en-US" sz="2800" u="sng" dirty="0"/>
+              <a:t>PANEL CONTENT</a:t>
+            </a:r>
+          </a:p>
+          <a:p>
+            <a:pPr algn="ctr"/>
+            <a:r>
+              <a:rPr lang="en-US" sz="1800" dirty="0" err="1"/>
+              <a:t>JLabels</a:t>
+            </a:r>
+            <a:endParaRPr lang="en-US" sz="1800" dirty="0"/>
+          </a:p>
+          <a:p>
+            <a:pPr algn="ctr"/>
+            <a:r>
+              <a:rPr lang="en-US" sz="1800" dirty="0" err="1"/>
+              <a:t>JButtons</a:t>
+            </a:r>
+            <a:endParaRPr lang="en-US" sz="1800" dirty="0"/>
+          </a:p>
+          <a:p>
+            <a:pPr algn="ctr"/>
+            <a:r>
+              <a:rPr lang="en-US" sz="1800" dirty="0" err="1"/>
+              <a:t>JTextFields</a:t>
+            </a:r>
+            <a:endParaRPr lang="en-US" sz="1800" dirty="0"/>
+          </a:p>
+        </p:txBody>
+      </p:sp>
+      <p:sp>
+        <p:nvSpPr>
+          <p:cNvPr id="7" name="TextBox 6">
+            <a:extLst>
+              <a:ext uri="{FF2B5EF4-FFF2-40B4-BE49-F238E27FC236}">
+                <a16:creationId xmlns:a16="http://schemas.microsoft.com/office/drawing/2014/main" xmlns="" id="{7A859ED5-2F86-4057-89E9-91F29A11A11D}"/>
+              </a:ext>
+            </a:extLst>
+          </p:cNvPr>
+          <p:cNvSpPr txBox="1"/>
+          <p:nvPr/>
+        </p:nvSpPr>
+        <p:spPr>
+          <a:xfrm>
+            <a:off x="1872116" y="261123"/>
+            <a:ext cx="4045686" cy="707886"/>
+          </a:xfrm>
+          <a:prstGeom prst="rect">
+            <a:avLst/>
+          </a:prstGeom>
+          <a:noFill/>
+        </p:spPr>
+        <p:txBody>
+          <a:bodyPr wrap="square" rtlCol="0">
+            <a:spAutoFit/>
+          </a:bodyPr>
+          <a:lstStyle/>
+          <a:p>
+            <a:r>
+              <a:rPr lang="en-US" sz="4000" dirty="0"/>
+              <a:t>CODE EXAMPLE:</a:t>
+            </a:r>
+          </a:p>
+        </p:txBody>
+      </p:sp>
+    </p:spTree>
+    <p:extLst>
+      <p:ext uri="{BB962C8B-B14F-4D97-AF65-F5344CB8AC3E}">
+        <p14:creationId xmlns:p14="http://schemas.microsoft.com/office/powerpoint/2010/main" val="181971971"/>
+      </p:ext>
+    </p:extLst>
+  </p:cSld>
+  <p:clrMapOvr>
+    <a:masterClrMapping/>
+  </p:clrMapOvr>
+</p:sld>
+</file>
+
+<file path=ppt/slides/slide4.xml><?xml version="1.0" encoding="utf-8"?>
+<p:sld xmlns:a="http://schemas.openxmlformats.org/drawingml/2006/main" xmlns:r="http://schemas.openxmlformats.org/officeDocument/2006/relationships" xmlns:p="http://schemas.openxmlformats.org/presentationml/2006/main">
+  <p:cSld>
+    <p:spTree>
+      <p:nvGrpSpPr>
+        <p:cNvPr id="1" name=""/>
+        <p:cNvGrpSpPr/>
+        <p:nvPr/>
+      </p:nvGrpSpPr>
+      <p:grpSpPr>
+        <a:xfrm>
+          <a:off x="0" y="0"/>
+          <a:ext cx="0" cy="0"/>
+          <a:chOff x="0" y="0"/>
+          <a:chExt cx="0" cy="0"/>
+        </a:xfrm>
+      </p:grpSpPr>
+      <p:sp>
+        <p:nvSpPr>
+          <p:cNvPr id="2" name="Title 1">
+            <a:extLst>
+              <a:ext uri="{FF2B5EF4-FFF2-40B4-BE49-F238E27FC236}">
+                <a16:creationId xmlns:a16="http://schemas.microsoft.com/office/drawing/2014/main" xmlns="" id="{4DF97F2A-1C61-45E1-8FFA-D92E98296125}"/>
               </a:ext>
             </a:extLst>
           </p:cNvPr>
@@ -7063,7 +7592,7 @@
           <p:cNvPr id="6" name="Content Placeholder 5">
             <a:extLst>
               <a:ext uri="{FF2B5EF4-FFF2-40B4-BE49-F238E27FC236}">
-                <a16:creationId xmlns:a16="http://schemas.microsoft.com/office/drawing/2014/main" id="{03C4A6CB-7634-4530-9EBB-6ACE5D8A3AA0}"/>
+                <a16:creationId xmlns:a16="http://schemas.microsoft.com/office/drawing/2014/main" xmlns="" id="{03C4A6CB-7634-4530-9EBB-6ACE5D8A3AA0}"/>
               </a:ext>
             </a:extLst>
           </p:cNvPr>
@@ -7092,7 +7621,7 @@
           <p:cNvPr id="4" name="Text Placeholder 3">
             <a:extLst>
               <a:ext uri="{FF2B5EF4-FFF2-40B4-BE49-F238E27FC236}">
-                <a16:creationId xmlns:a16="http://schemas.microsoft.com/office/drawing/2014/main" id="{82CC2D71-93DE-4F5B-8654-108BE506A3A8}"/>
+                <a16:creationId xmlns:a16="http://schemas.microsoft.com/office/drawing/2014/main" xmlns="" id="{82CC2D71-93DE-4F5B-8654-108BE506A3A8}"/>
               </a:ext>
             </a:extLst>
           </p:cNvPr>
@@ -7174,7 +7703,7 @@
           <p:cNvPr id="11" name="TextBox 10">
             <a:extLst>
               <a:ext uri="{FF2B5EF4-FFF2-40B4-BE49-F238E27FC236}">
-                <a16:creationId xmlns:a16="http://schemas.microsoft.com/office/drawing/2014/main" id="{D05D7B08-C0DA-42C0-BAD3-9CB50D11CB19}"/>
+                <a16:creationId xmlns:a16="http://schemas.microsoft.com/office/drawing/2014/main" xmlns="" id="{D05D7B08-C0DA-42C0-BAD3-9CB50D11CB19}"/>
               </a:ext>
             </a:extLst>
           </p:cNvPr>
@@ -7209,7 +7738,7 @@
           <p:cNvPr id="13" name="Content Placeholder 5">
             <a:extLst>
               <a:ext uri="{FF2B5EF4-FFF2-40B4-BE49-F238E27FC236}">
-                <a16:creationId xmlns:a16="http://schemas.microsoft.com/office/drawing/2014/main" id="{8D5A2897-EA1C-4623-8782-C779B6686583}"/>
+                <a16:creationId xmlns:a16="http://schemas.microsoft.com/office/drawing/2014/main" xmlns="" id="{8D5A2897-EA1C-4623-8782-C779B6686583}"/>
               </a:ext>
             </a:extLst>
           </p:cNvPr>
@@ -7247,236 +7776,6 @@
 </p:sld>
 </file>
 
-<file path=ppt/slides/slide4.xml><?xml version="1.0" encoding="utf-8"?>
-<p:sld xmlns:a="http://schemas.openxmlformats.org/drawingml/2006/main" xmlns:r="http://schemas.openxmlformats.org/officeDocument/2006/relationships" xmlns:p="http://schemas.openxmlformats.org/presentationml/2006/main">
-  <p:cSld>
-    <p:spTree>
-      <p:nvGrpSpPr>
-        <p:cNvPr id="1" name=""/>
-        <p:cNvGrpSpPr/>
-        <p:nvPr/>
-      </p:nvGrpSpPr>
-      <p:grpSpPr>
-        <a:xfrm>
-          <a:off x="0" y="0"/>
-          <a:ext cx="0" cy="0"/>
-          <a:chOff x="0" y="0"/>
-          <a:chExt cx="0" cy="0"/>
-        </a:xfrm>
-      </p:grpSpPr>
-      <p:sp>
-        <p:nvSpPr>
-          <p:cNvPr id="2" name="Title 1">
-            <a:extLst>
-              <a:ext uri="{FF2B5EF4-FFF2-40B4-BE49-F238E27FC236}">
-                <a16:creationId xmlns:a16="http://schemas.microsoft.com/office/drawing/2014/main" id="{CAE6CE5C-0172-40BB-8ED4-66C6F6FE3A68}"/>
-              </a:ext>
-            </a:extLst>
-          </p:cNvPr>
-          <p:cNvSpPr>
-            <a:spLocks noGrp="1"/>
-          </p:cNvSpPr>
-          <p:nvPr>
-            <p:ph type="title"/>
-          </p:nvPr>
-        </p:nvSpPr>
-        <p:spPr/>
-        <p:txBody>
-          <a:bodyPr>
-            <a:normAutofit/>
-          </a:bodyPr>
-          <a:lstStyle/>
-          <a:p>
-            <a:pPr algn="ctr"/>
-            <a:r>
-              <a:rPr lang="en-US" sz="5400" dirty="0"/>
-              <a:t>VIEW</a:t>
-            </a:r>
-          </a:p>
-        </p:txBody>
-      </p:sp>
-      <p:pic>
-        <p:nvPicPr>
-          <p:cNvPr id="6" name="Content Placeholder 5">
-            <a:extLst>
-              <a:ext uri="{FF2B5EF4-FFF2-40B4-BE49-F238E27FC236}">
-                <a16:creationId xmlns:a16="http://schemas.microsoft.com/office/drawing/2014/main" id="{0F89C3FC-69C7-44EB-B52F-97AFC9F0C0A6}"/>
-              </a:ext>
-            </a:extLst>
-          </p:cNvPr>
-          <p:cNvPicPr>
-            <a:picLocks noGrp="1" noChangeAspect="1"/>
-          </p:cNvPicPr>
-          <p:nvPr>
-            <p:ph idx="1"/>
-          </p:nvPr>
-        </p:nvPicPr>
-        <p:blipFill>
-          <a:blip r:embed="rId2"/>
-          <a:stretch>
-            <a:fillRect/>
-          </a:stretch>
-        </p:blipFill>
-        <p:spPr>
-          <a:xfrm>
-            <a:off x="1915428" y="1128208"/>
-            <a:ext cx="4045686" cy="5566162"/>
-          </a:xfrm>
-        </p:spPr>
-      </p:pic>
-      <p:sp>
-        <p:nvSpPr>
-          <p:cNvPr id="4" name="Text Placeholder 3">
-            <a:extLst>
-              <a:ext uri="{FF2B5EF4-FFF2-40B4-BE49-F238E27FC236}">
-                <a16:creationId xmlns:a16="http://schemas.microsoft.com/office/drawing/2014/main" id="{82EECC6E-BA75-4321-B49B-7DBAD34631F8}"/>
-              </a:ext>
-            </a:extLst>
-          </p:cNvPr>
-          <p:cNvSpPr>
-            <a:spLocks noGrp="1"/>
-          </p:cNvSpPr>
-          <p:nvPr>
-            <p:ph type="body" sz="half" idx="2"/>
-          </p:nvPr>
-        </p:nvSpPr>
-        <p:spPr>
-          <a:xfrm>
-            <a:off x="8337885" y="1741336"/>
-            <a:ext cx="3092115" cy="4750904"/>
-          </a:xfrm>
-        </p:spPr>
-        <p:txBody>
-          <a:bodyPr>
-            <a:normAutofit fontScale="92500" lnSpcReduction="20000"/>
-          </a:bodyPr>
-          <a:lstStyle/>
-          <a:p>
-            <a:pPr algn="ctr"/>
-            <a:r>
-              <a:rPr lang="en-US" sz="2800" u="sng" dirty="0"/>
-              <a:t>MAIN FRAME</a:t>
-            </a:r>
-          </a:p>
-          <a:p>
-            <a:pPr algn="ctr"/>
-            <a:r>
-              <a:rPr lang="en-US" sz="2800" u="sng" dirty="0"/>
-              <a:t>PANELS</a:t>
-            </a:r>
-          </a:p>
-          <a:p>
-            <a:pPr algn="ctr"/>
-            <a:r>
-              <a:rPr lang="en-US" sz="1800" dirty="0" err="1"/>
-              <a:t>LogInPanel</a:t>
-            </a:r>
-            <a:endParaRPr lang="en-US" sz="1800" dirty="0"/>
-          </a:p>
-          <a:p>
-            <a:pPr algn="ctr"/>
-            <a:r>
-              <a:rPr lang="en-US" sz="1800" dirty="0" err="1"/>
-              <a:t>HomePanel</a:t>
-            </a:r>
-            <a:endParaRPr lang="en-US" sz="1800" dirty="0"/>
-          </a:p>
-          <a:p>
-            <a:pPr algn="ctr"/>
-            <a:r>
-              <a:rPr lang="en-US" sz="1800" dirty="0" err="1"/>
-              <a:t>AccountPanel</a:t>
-            </a:r>
-            <a:endParaRPr lang="en-US" sz="1800" dirty="0"/>
-          </a:p>
-          <a:p>
-            <a:pPr algn="ctr"/>
-            <a:r>
-              <a:rPr lang="en-US" sz="1800" dirty="0"/>
-              <a:t>Etc.</a:t>
-            </a:r>
-          </a:p>
-          <a:p>
-            <a:pPr algn="ctr"/>
-            <a:r>
-              <a:rPr lang="en-US" sz="2800" u="sng" dirty="0"/>
-              <a:t>PANEL CONTENT</a:t>
-            </a:r>
-          </a:p>
-          <a:p>
-            <a:pPr algn="ctr"/>
-            <a:r>
-              <a:rPr lang="en-US" sz="1800" dirty="0" err="1"/>
-              <a:t>JLabels</a:t>
-            </a:r>
-            <a:endParaRPr lang="en-US" sz="1800" dirty="0"/>
-          </a:p>
-          <a:p>
-            <a:pPr algn="ctr"/>
-            <a:r>
-              <a:rPr lang="en-US" sz="1800" dirty="0" err="1"/>
-              <a:t>JButtons</a:t>
-            </a:r>
-            <a:endParaRPr lang="en-US" sz="1800" dirty="0"/>
-          </a:p>
-          <a:p>
-            <a:pPr algn="ctr"/>
-            <a:r>
-              <a:rPr lang="en-US" sz="1800" dirty="0" err="1"/>
-              <a:t>JTextFields</a:t>
-            </a:r>
-            <a:endParaRPr lang="en-US" sz="1800" dirty="0"/>
-          </a:p>
-        </p:txBody>
-      </p:sp>
-      <p:sp>
-        <p:nvSpPr>
-          <p:cNvPr id="7" name="TextBox 6">
-            <a:extLst>
-              <a:ext uri="{FF2B5EF4-FFF2-40B4-BE49-F238E27FC236}">
-                <a16:creationId xmlns:a16="http://schemas.microsoft.com/office/drawing/2014/main" id="{7A859ED5-2F86-4057-89E9-91F29A11A11D}"/>
-              </a:ext>
-            </a:extLst>
-          </p:cNvPr>
-          <p:cNvSpPr txBox="1"/>
-          <p:nvPr/>
-        </p:nvSpPr>
-        <p:spPr>
-          <a:xfrm>
-            <a:off x="1872116" y="261123"/>
-            <a:ext cx="4045686" cy="707886"/>
-          </a:xfrm>
-          <a:prstGeom prst="rect">
-            <a:avLst/>
-          </a:prstGeom>
-          <a:noFill/>
-        </p:spPr>
-        <p:txBody>
-          <a:bodyPr wrap="square" rtlCol="0">
-            <a:spAutoFit/>
-          </a:bodyPr>
-          <a:lstStyle/>
-          <a:p>
-            <a:r>
-              <a:rPr lang="en-US" sz="4000" dirty="0"/>
-              <a:t>CODE EXAMPLE:</a:t>
-            </a:r>
-          </a:p>
-        </p:txBody>
-      </p:sp>
-    </p:spTree>
-    <p:extLst>
-      <p:ext uri="{BB962C8B-B14F-4D97-AF65-F5344CB8AC3E}">
-        <p14:creationId xmlns:p14="http://schemas.microsoft.com/office/powerpoint/2010/main" val="181971971"/>
-      </p:ext>
-    </p:extLst>
-  </p:cSld>
-  <p:clrMapOvr>
-    <a:masterClrMapping/>
-  </p:clrMapOvr>
-</p:sld>
-</file>
-
 <file path=ppt/slides/slide5.xml><?xml version="1.0" encoding="utf-8"?>
 <p:sld xmlns:a="http://schemas.openxmlformats.org/drawingml/2006/main" xmlns:r="http://schemas.openxmlformats.org/officeDocument/2006/relationships" xmlns:p="http://schemas.openxmlformats.org/presentationml/2006/main">
   <p:cSld>
@@ -7496,433 +7795,193 @@
       </p:grpSpPr>
       <p:sp>
         <p:nvSpPr>
-          <p:cNvPr id="13" name="Arrow: Curved Right 12">
+          <p:cNvPr id="2" name="Title 1">
             <a:extLst>
               <a:ext uri="{FF2B5EF4-FFF2-40B4-BE49-F238E27FC236}">
-                <a16:creationId xmlns:a16="http://schemas.microsoft.com/office/drawing/2014/main" id="{9E8D8E94-1074-48E8-B571-F04AF75DF7FC}"/>
+                <a16:creationId xmlns:a16="http://schemas.microsoft.com/office/drawing/2014/main" xmlns="" id="{5ABBF08F-2582-4E09-8D8C-7775E33B85AD}"/>
               </a:ext>
             </a:extLst>
           </p:cNvPr>
-          <p:cNvSpPr/>
-          <p:nvPr/>
+          <p:cNvSpPr>
+            <a:spLocks noGrp="1"/>
+          </p:cNvSpPr>
+          <p:nvPr>
+            <p:ph type="title"/>
+          </p:nvPr>
         </p:nvSpPr>
         <p:spPr>
-          <a:xfrm rot="963525">
-            <a:off x="4763220" y="1286298"/>
-            <a:ext cx="651005" cy="2065535"/>
+          <a:xfrm>
+            <a:off x="6312498" y="451899"/>
+            <a:ext cx="7137133" cy="1196671"/>
           </a:xfrm>
-          <a:prstGeom prst="curvedRightArrow">
-            <a:avLst/>
-          </a:prstGeom>
         </p:spPr>
-        <p:style>
-          <a:lnRef idx="2">
-            <a:schemeClr val="accent1">
-              <a:shade val="50000"/>
-            </a:schemeClr>
-          </a:lnRef>
-          <a:fillRef idx="1">
-            <a:schemeClr val="accent1"/>
-          </a:fillRef>
-          <a:effectRef idx="0">
-            <a:schemeClr val="accent1"/>
-          </a:effectRef>
-          <a:fontRef idx="minor">
-            <a:schemeClr val="lt1"/>
-          </a:fontRef>
-        </p:style>
         <p:txBody>
-          <a:bodyPr rtlCol="0" anchor="ctr"/>
+          <a:bodyPr>
+            <a:normAutofit/>
+          </a:bodyPr>
           <a:lstStyle/>
           <a:p>
             <a:pPr algn="ctr"/>
-            <a:endParaRPr lang="en-US">
-              <a:solidFill>
-                <a:schemeClr val="tx1"/>
-              </a:solidFill>
-            </a:endParaRPr>
+            <a:r>
+              <a:rPr lang="en-US" sz="5400" dirty="0"/>
+              <a:t>MODEL</a:t>
+            </a:r>
           </a:p>
         </p:txBody>
       </p:sp>
       <p:sp>
         <p:nvSpPr>
-          <p:cNvPr id="12" name="Arrow: Curved Left 11">
+          <p:cNvPr id="4" name="Text Placeholder 3">
             <a:extLst>
               <a:ext uri="{FF2B5EF4-FFF2-40B4-BE49-F238E27FC236}">
-                <a16:creationId xmlns:a16="http://schemas.microsoft.com/office/drawing/2014/main" id="{CCEA8BB3-EFD5-4EDC-A58E-6F27AC9F44DC}"/>
+                <a16:creationId xmlns:a16="http://schemas.microsoft.com/office/drawing/2014/main" xmlns="" id="{9AEA9920-571F-42E4-A389-F16775334A8C}"/>
               </a:ext>
             </a:extLst>
           </p:cNvPr>
-          <p:cNvSpPr/>
-          <p:nvPr/>
+          <p:cNvSpPr>
+            <a:spLocks noGrp="1"/>
+          </p:cNvSpPr>
+          <p:nvPr>
+            <p:ph type="body" sz="half" idx="2"/>
+          </p:nvPr>
         </p:nvSpPr>
         <p:spPr>
-          <a:xfrm rot="19684834">
-            <a:off x="9333298" y="1180698"/>
-            <a:ext cx="697831" cy="2146433"/>
+          <a:xfrm>
+            <a:off x="8335006" y="2080731"/>
+            <a:ext cx="3092115" cy="4164164"/>
           </a:xfrm>
-          <a:prstGeom prst="curvedLeftArrow">
-            <a:avLst/>
-          </a:prstGeom>
         </p:spPr>
-        <p:style>
-          <a:lnRef idx="2">
-            <a:schemeClr val="accent1">
-              <a:shade val="50000"/>
-            </a:schemeClr>
-          </a:lnRef>
-          <a:fillRef idx="1">
-            <a:schemeClr val="accent1"/>
-          </a:fillRef>
-          <a:effectRef idx="0">
-            <a:schemeClr val="accent1"/>
-          </a:effectRef>
-          <a:fontRef idx="minor">
-            <a:schemeClr val="lt1"/>
-          </a:fontRef>
-        </p:style>
         <p:txBody>
-          <a:bodyPr rtlCol="0" anchor="ctr"/>
+          <a:bodyPr>
+            <a:normAutofit/>
+          </a:bodyPr>
           <a:lstStyle/>
           <a:p>
             <a:pPr algn="ctr"/>
-            <a:endParaRPr lang="en-US">
+            <a:r>
+              <a:rPr lang="en-US" sz="2800" u="sng" dirty="0">
+                <a:solidFill>
+                  <a:schemeClr val="bg1"/>
+                </a:solidFill>
+              </a:rPr>
+              <a:t>MAIN CLASSES</a:t>
+            </a:r>
+          </a:p>
+          <a:p>
+            <a:pPr algn="ctr"/>
+            <a:r>
+              <a:rPr lang="en-US" sz="2000" dirty="0">
+                <a:solidFill>
+                  <a:schemeClr val="bg1"/>
+                </a:solidFill>
+              </a:rPr>
+              <a:t>Account</a:t>
+            </a:r>
+          </a:p>
+          <a:p>
+            <a:pPr algn="ctr"/>
+            <a:r>
+              <a:rPr lang="en-US" sz="2000" dirty="0">
+                <a:solidFill>
+                  <a:schemeClr val="bg1"/>
+                </a:solidFill>
+              </a:rPr>
+              <a:t>Transaction</a:t>
+            </a:r>
+          </a:p>
+          <a:p>
+            <a:pPr algn="ctr"/>
+            <a:r>
+              <a:rPr lang="en-US" sz="2000" dirty="0">
+                <a:solidFill>
+                  <a:schemeClr val="bg1"/>
+                </a:solidFill>
+              </a:rPr>
+              <a:t>Withdrawal</a:t>
+            </a:r>
+          </a:p>
+          <a:p>
+            <a:pPr algn="ctr"/>
+            <a:r>
+              <a:rPr lang="en-US" sz="2000" dirty="0" smtClean="0">
+                <a:solidFill>
+                  <a:schemeClr val="bg1"/>
+                </a:solidFill>
+              </a:rPr>
+              <a:t>Deposit</a:t>
+            </a:r>
+            <a:endParaRPr lang="en-US" sz="2000" dirty="0">
               <a:solidFill>
-                <a:schemeClr val="tx1"/>
+                <a:schemeClr val="bg1"/>
               </a:solidFill>
             </a:endParaRPr>
           </a:p>
         </p:txBody>
       </p:sp>
-      <p:sp>
-        <p:nvSpPr>
-          <p:cNvPr id="4" name="Rectangle: Rounded Corners 3">
+      <p:pic>
+        <p:nvPicPr>
+          <p:cNvPr id="3" name="Picture 2"/>
+          <p:cNvPicPr>
+            <a:picLocks noChangeAspect="1"/>
+          </p:cNvPicPr>
+          <p:nvPr/>
+        </p:nvPicPr>
+        <p:blipFill>
+          <a:blip r:embed="rId2">
             <a:extLst>
-              <a:ext uri="{FF2B5EF4-FFF2-40B4-BE49-F238E27FC236}">
-                <a16:creationId xmlns:a16="http://schemas.microsoft.com/office/drawing/2014/main" id="{D34EBDAA-6E44-4CB0-9188-F0204E9EF15E}"/>
+              <a:ext uri="{28A0092B-C50C-407E-A947-70E740481C1C}">
+                <a14:useLocalDpi xmlns:a14="http://schemas.microsoft.com/office/drawing/2010/main" val="0"/>
               </a:ext>
             </a:extLst>
-          </p:cNvPr>
-          <p:cNvSpPr/>
-          <p:nvPr/>
-        </p:nvSpPr>
+          </a:blip>
+          <a:stretch>
+            <a:fillRect/>
+          </a:stretch>
+        </p:blipFill>
         <p:spPr>
           <a:xfrm>
-            <a:off x="5548965" y="904775"/>
-            <a:ext cx="3859730" cy="1155032"/>
-          </a:xfrm>
-          <a:prstGeom prst="roundRect">
-            <a:avLst/>
-          </a:prstGeom>
-        </p:spPr>
-        <p:style>
-          <a:lnRef idx="2">
-            <a:schemeClr val="accent1">
-              <a:shade val="50000"/>
-            </a:schemeClr>
-          </a:lnRef>
-          <a:fillRef idx="1">
-            <a:schemeClr val="accent1"/>
-          </a:fillRef>
-          <a:effectRef idx="0">
-            <a:schemeClr val="accent1"/>
-          </a:effectRef>
-          <a:fontRef idx="minor">
-            <a:schemeClr val="lt1"/>
-          </a:fontRef>
-        </p:style>
-        <p:txBody>
-          <a:bodyPr rot="0" spcFirstLastPara="0" vertOverflow="overflow" horzOverflow="overflow" vert="horz" wrap="square" lIns="91440" tIns="45720" rIns="91440" bIns="45720" numCol="1" spcCol="0" rtlCol="0" fromWordArt="0" anchor="ctr" anchorCtr="0" forceAA="0" compatLnSpc="1">
-            <a:prstTxWarp prst="textNoShape">
-              <a:avLst/>
-            </a:prstTxWarp>
-            <a:noAutofit/>
-          </a:bodyPr>
-          <a:lstStyle/>
-          <a:p>
-            <a:pPr algn="ctr"/>
-            <a:r>
-              <a:rPr lang="en-US" sz="3200" b="1" dirty="0">
-                <a:ln w="22225">
-                  <a:solidFill>
-                    <a:schemeClr val="accent2"/>
-                  </a:solidFill>
-                  <a:prstDash val="solid"/>
-                </a:ln>
-                <a:solidFill>
-                  <a:schemeClr val="accent2">
-                    <a:lumMod val="40000"/>
-                    <a:lumOff val="60000"/>
-                  </a:schemeClr>
-                </a:solidFill>
-              </a:rPr>
-              <a:t>CONTROLLER</a:t>
-            </a:r>
-          </a:p>
-        </p:txBody>
-      </p:sp>
-      <p:sp>
-        <p:nvSpPr>
-          <p:cNvPr id="5" name="Rectangle: Rounded Corners 4">
-            <a:extLst>
-              <a:ext uri="{FF2B5EF4-FFF2-40B4-BE49-F238E27FC236}">
-                <a16:creationId xmlns:a16="http://schemas.microsoft.com/office/drawing/2014/main" id="{5A069AE0-5359-47AE-9301-53690ECEBFDD}"/>
-              </a:ext>
-            </a:extLst>
-          </p:cNvPr>
-          <p:cNvSpPr/>
-          <p:nvPr/>
-        </p:nvSpPr>
-        <p:spPr>
-          <a:xfrm>
-            <a:off x="2982228" y="3283818"/>
-            <a:ext cx="3859730" cy="1155032"/>
-          </a:xfrm>
-          <a:prstGeom prst="roundRect">
-            <a:avLst/>
-          </a:prstGeom>
-        </p:spPr>
-        <p:style>
-          <a:lnRef idx="2">
-            <a:schemeClr val="accent1">
-              <a:shade val="50000"/>
-            </a:schemeClr>
-          </a:lnRef>
-          <a:fillRef idx="1">
-            <a:schemeClr val="accent1"/>
-          </a:fillRef>
-          <a:effectRef idx="0">
-            <a:schemeClr val="accent1"/>
-          </a:effectRef>
-          <a:fontRef idx="minor">
-            <a:schemeClr val="lt1"/>
-          </a:fontRef>
-        </p:style>
-        <p:txBody>
-          <a:bodyPr rtlCol="0" anchor="ctr"/>
-          <a:lstStyle/>
-          <a:p>
-            <a:pPr algn="ctr"/>
-            <a:r>
-              <a:rPr lang="en-US" sz="4800" b="1" dirty="0">
-                <a:ln w="22225">
-                  <a:solidFill>
-                    <a:schemeClr val="accent2"/>
-                  </a:solidFill>
-                  <a:prstDash val="solid"/>
-                </a:ln>
-                <a:solidFill>
-                  <a:schemeClr val="accent2">
-                    <a:lumMod val="40000"/>
-                    <a:lumOff val="60000"/>
-                  </a:schemeClr>
-                </a:solidFill>
-              </a:rPr>
-              <a:t>MODEL</a:t>
-            </a:r>
-            <a:endParaRPr lang="en-US" sz="4800" dirty="0"/>
-          </a:p>
-        </p:txBody>
-      </p:sp>
-      <p:sp>
-        <p:nvSpPr>
-          <p:cNvPr id="6" name="Rectangle: Rounded Corners 5">
-            <a:extLst>
-              <a:ext uri="{FF2B5EF4-FFF2-40B4-BE49-F238E27FC236}">
-                <a16:creationId xmlns:a16="http://schemas.microsoft.com/office/drawing/2014/main" id="{3A5E7BD6-B02F-4A84-A853-EFDA52B4C52F}"/>
-              </a:ext>
-            </a:extLst>
-          </p:cNvPr>
-          <p:cNvSpPr/>
-          <p:nvPr/>
-        </p:nvSpPr>
-        <p:spPr>
-          <a:xfrm>
-            <a:off x="8139765" y="3283818"/>
-            <a:ext cx="3859730" cy="1155032"/>
-          </a:xfrm>
-          <a:prstGeom prst="roundRect">
-            <a:avLst/>
-          </a:prstGeom>
-        </p:spPr>
-        <p:style>
-          <a:lnRef idx="2">
-            <a:schemeClr val="accent1">
-              <a:shade val="50000"/>
-            </a:schemeClr>
-          </a:lnRef>
-          <a:fillRef idx="1">
-            <a:schemeClr val="accent1"/>
-          </a:fillRef>
-          <a:effectRef idx="0">
-            <a:schemeClr val="accent1"/>
-          </a:effectRef>
-          <a:fontRef idx="minor">
-            <a:schemeClr val="lt1"/>
-          </a:fontRef>
-        </p:style>
-        <p:txBody>
-          <a:bodyPr rtlCol="0" anchor="ctr"/>
-          <a:lstStyle/>
-          <a:p>
-            <a:pPr algn="ctr"/>
-            <a:r>
-              <a:rPr lang="en-US" sz="4800" b="1" dirty="0">
-                <a:ln w="22225">
-                  <a:solidFill>
-                    <a:schemeClr val="accent2"/>
-                  </a:solidFill>
-                  <a:prstDash val="solid"/>
-                </a:ln>
-                <a:solidFill>
-                  <a:schemeClr val="accent2">
-                    <a:lumMod val="40000"/>
-                    <a:lumOff val="60000"/>
-                  </a:schemeClr>
-                </a:solidFill>
-              </a:rPr>
-              <a:t>VIEW</a:t>
-            </a:r>
-            <a:endParaRPr lang="en-US" sz="4800" dirty="0"/>
-          </a:p>
-        </p:txBody>
-      </p:sp>
-      <p:sp>
-        <p:nvSpPr>
-          <p:cNvPr id="9" name="Arrow: Up 8">
-            <a:extLst>
-              <a:ext uri="{FF2B5EF4-FFF2-40B4-BE49-F238E27FC236}">
-                <a16:creationId xmlns:a16="http://schemas.microsoft.com/office/drawing/2014/main" id="{2945D2A4-4237-4A37-A8C3-518DDF249A1C}"/>
-              </a:ext>
-            </a:extLst>
-          </p:cNvPr>
-          <p:cNvSpPr/>
-          <p:nvPr/>
-        </p:nvSpPr>
-        <p:spPr>
-          <a:xfrm>
-            <a:off x="6126480" y="2253915"/>
-            <a:ext cx="715478" cy="1029903"/>
-          </a:xfrm>
-          <a:prstGeom prst="upArrow">
-            <a:avLst/>
-          </a:prstGeom>
-        </p:spPr>
-        <p:style>
-          <a:lnRef idx="2">
-            <a:schemeClr val="accent1">
-              <a:shade val="50000"/>
-            </a:schemeClr>
-          </a:lnRef>
-          <a:fillRef idx="1">
-            <a:schemeClr val="accent1"/>
-          </a:fillRef>
-          <a:effectRef idx="0">
-            <a:schemeClr val="accent1"/>
-          </a:effectRef>
-          <a:fontRef idx="minor">
-            <a:schemeClr val="lt1"/>
-          </a:fontRef>
-        </p:style>
-        <p:txBody>
-          <a:bodyPr rtlCol="0" anchor="ctr"/>
-          <a:lstStyle/>
-          <a:p>
-            <a:pPr algn="ctr"/>
-            <a:endParaRPr lang="en-US"/>
-          </a:p>
-        </p:txBody>
-      </p:sp>
-      <p:sp>
-        <p:nvSpPr>
-          <p:cNvPr id="10" name="Arrow: Up 9">
-            <a:extLst>
-              <a:ext uri="{FF2B5EF4-FFF2-40B4-BE49-F238E27FC236}">
-                <a16:creationId xmlns:a16="http://schemas.microsoft.com/office/drawing/2014/main" id="{1CB8B7DB-8E8D-4B07-A9D4-D52BE6BC7360}"/>
-              </a:ext>
-            </a:extLst>
-          </p:cNvPr>
-          <p:cNvSpPr/>
-          <p:nvPr/>
-        </p:nvSpPr>
-        <p:spPr>
-          <a:xfrm>
-            <a:off x="8227996" y="2253915"/>
-            <a:ext cx="715478" cy="1029903"/>
-          </a:xfrm>
-          <a:prstGeom prst="upArrow">
-            <a:avLst/>
-          </a:prstGeom>
-        </p:spPr>
-        <p:style>
-          <a:lnRef idx="2">
-            <a:schemeClr val="accent1">
-              <a:shade val="50000"/>
-            </a:schemeClr>
-          </a:lnRef>
-          <a:fillRef idx="1">
-            <a:schemeClr val="accent1"/>
-          </a:fillRef>
-          <a:effectRef idx="0">
-            <a:schemeClr val="accent1"/>
-          </a:effectRef>
-          <a:fontRef idx="minor">
-            <a:schemeClr val="lt1"/>
-          </a:fontRef>
-        </p:style>
-        <p:txBody>
-          <a:bodyPr rtlCol="0" anchor="ctr"/>
-          <a:lstStyle/>
-          <a:p>
-            <a:pPr algn="ctr"/>
-            <a:endParaRPr lang="en-US"/>
-          </a:p>
-        </p:txBody>
-      </p:sp>
-      <p:sp>
-        <p:nvSpPr>
-          <p:cNvPr id="14" name="TextBox 13">
-            <a:extLst>
-              <a:ext uri="{FF2B5EF4-FFF2-40B4-BE49-F238E27FC236}">
-                <a16:creationId xmlns:a16="http://schemas.microsoft.com/office/drawing/2014/main" id="{FAB8EF5F-1EDE-4EF7-92D0-70D11B73813A}"/>
-              </a:ext>
-            </a:extLst>
-          </p:cNvPr>
-          <p:cNvSpPr txBox="1"/>
-          <p:nvPr/>
-        </p:nvSpPr>
-        <p:spPr>
-          <a:xfrm>
-            <a:off x="-77002" y="3056946"/>
-            <a:ext cx="2295625" cy="584775"/>
+            <a:off x="449469" y="185530"/>
+            <a:ext cx="5050183" cy="3377469"/>
           </a:xfrm>
           <a:prstGeom prst="rect">
             <a:avLst/>
           </a:prstGeom>
-          <a:noFill/>
         </p:spPr>
-        <p:txBody>
-          <a:bodyPr wrap="square" rtlCol="0">
-            <a:spAutoFit/>
-          </a:bodyPr>
-          <a:lstStyle/>
-          <a:p>
-            <a:pPr algn="ctr"/>
-            <a:r>
-              <a:rPr lang="en-US" sz="3200" b="1" dirty="0">
-                <a:solidFill>
-                  <a:schemeClr val="bg2"/>
-                </a:solidFill>
-              </a:rPr>
-              <a:t>DIAGRAM</a:t>
-            </a:r>
-          </a:p>
-        </p:txBody>
-      </p:sp>
+      </p:pic>
+      <p:pic>
+        <p:nvPicPr>
+          <p:cNvPr id="5" name="Picture 4"/>
+          <p:cNvPicPr>
+            <a:picLocks noChangeAspect="1"/>
+          </p:cNvPicPr>
+          <p:nvPr/>
+        </p:nvPicPr>
+        <p:blipFill>
+          <a:blip r:embed="rId3">
+            <a:extLst>
+              <a:ext uri="{28A0092B-C50C-407E-A947-70E740481C1C}">
+                <a14:useLocalDpi xmlns:a14="http://schemas.microsoft.com/office/drawing/2010/main" val="0"/>
+              </a:ext>
+            </a:extLst>
+          </a:blip>
+          <a:stretch>
+            <a:fillRect/>
+          </a:stretch>
+        </p:blipFill>
+        <p:spPr>
+          <a:xfrm>
+            <a:off x="2008258" y="3723785"/>
+            <a:ext cx="5041899" cy="2889649"/>
+          </a:xfrm>
+          <a:prstGeom prst="rect">
+            <a:avLst/>
+          </a:prstGeom>
+        </p:spPr>
+      </p:pic>
     </p:spTree>
     <p:extLst>
       <p:ext uri="{BB962C8B-B14F-4D97-AF65-F5344CB8AC3E}">
-        <p14:creationId xmlns:p14="http://schemas.microsoft.com/office/powerpoint/2010/main" val="3012431970"/>
+        <p14:creationId xmlns:p14="http://schemas.microsoft.com/office/powerpoint/2010/main" val="919915019"/>
       </p:ext>
     </p:extLst>
   </p:cSld>

</xml_diff>

<commit_message>
moved from temp to master
</commit_message>
<xml_diff>
--- a/MVC.pptx
+++ b/MVC.pptx
@@ -6,10 +6,11 @@
   </p:sldMasterIdLst>
   <p:sldIdLst>
     <p:sldId id="256" r:id="rId2"/>
-    <p:sldId id="257" r:id="rId3"/>
-    <p:sldId id="258" r:id="rId4"/>
-    <p:sldId id="259" r:id="rId5"/>
-    <p:sldId id="260" r:id="rId6"/>
+    <p:sldId id="261" r:id="rId3"/>
+    <p:sldId id="257" r:id="rId4"/>
+    <p:sldId id="258" r:id="rId5"/>
+    <p:sldId id="259" r:id="rId6"/>
+    <p:sldId id="260" r:id="rId7"/>
   </p:sldIdLst>
   <p:sldSz cx="12192000" cy="6858000"/>
   <p:notesSz cx="6858000" cy="9144000"/>
@@ -1323,7 +1324,7 @@
             <a:fld id="{9334D819-9F07-4261-B09B-9E467E5D9002}" type="datetimeFigureOut">
               <a:rPr lang="en-US" dirty="0"/>
               <a:pPr/>
-              <a:t>10/18/2017</a:t>
+              <a:t>11/13/17</a:t>
             </a:fld>
             <a:endParaRPr lang="en-US" dirty="0"/>
           </a:p>
@@ -1557,7 +1558,7 @@
           <a:p>
             <a:fld id="{9334D819-9F07-4261-B09B-9E467E5D9002}" type="datetimeFigureOut">
               <a:rPr lang="en-US" dirty="0"/>
-              <a:t>10/18/2017</a:t>
+              <a:t>11/13/17</a:t>
             </a:fld>
             <a:endParaRPr lang="en-US" dirty="0"/>
           </a:p>
@@ -1732,7 +1733,7 @@
           <a:p>
             <a:fld id="{9334D819-9F07-4261-B09B-9E467E5D9002}" type="datetimeFigureOut">
               <a:rPr lang="en-US" dirty="0"/>
-              <a:t>10/18/2017</a:t>
+              <a:t>11/13/17</a:t>
             </a:fld>
             <a:endParaRPr lang="en-US" dirty="0"/>
           </a:p>
@@ -1897,7 +1898,7 @@
           <a:p>
             <a:fld id="{9334D819-9F07-4261-B09B-9E467E5D9002}" type="datetimeFigureOut">
               <a:rPr lang="en-US" dirty="0"/>
-              <a:t>10/18/2017</a:t>
+              <a:t>11/13/17</a:t>
             </a:fld>
             <a:endParaRPr lang="en-US" dirty="0"/>
           </a:p>
@@ -2169,7 +2170,7 @@
             <a:fld id="{9334D819-9F07-4261-B09B-9E467E5D9002}" type="datetimeFigureOut">
               <a:rPr lang="en-US" dirty="0"/>
               <a:pPr/>
-              <a:t>10/18/2017</a:t>
+              <a:t>11/13/17</a:t>
             </a:fld>
             <a:endParaRPr lang="en-US" dirty="0"/>
           </a:p>
@@ -3366,7 +3367,7 @@
           <a:p>
             <a:fld id="{9334D819-9F07-4261-B09B-9E467E5D9002}" type="datetimeFigureOut">
               <a:rPr lang="en-US" dirty="0"/>
-              <a:t>10/18/2017</a:t>
+              <a:t>11/13/17</a:t>
             </a:fld>
             <a:endParaRPr lang="en-US" dirty="0"/>
           </a:p>
@@ -3421,7 +3422,7 @@
   </p:clrMapOvr>
   <p:extLst mod="1">
     <p:ext uri="{DCECCB84-F9BA-43D5-87BE-67443E8EF086}">
-      <p15:sldGuideLst xmlns:p15="http://schemas.microsoft.com/office/powerpoint/2012/main"/>
+      <p15:sldGuideLst xmlns:p15="http://schemas.microsoft.com/office/powerpoint/2012/main" xmlns=""/>
     </p:ext>
   </p:extLst>
 </p:sldLayout>
@@ -3751,7 +3752,7 @@
           <a:p>
             <a:fld id="{9334D819-9F07-4261-B09B-9E467E5D9002}" type="datetimeFigureOut">
               <a:rPr lang="en-US" dirty="0"/>
-              <a:t>10/18/2017</a:t>
+              <a:t>11/13/17</a:t>
             </a:fld>
             <a:endParaRPr lang="en-US" dirty="0"/>
           </a:p>
@@ -3806,7 +3807,7 @@
   </p:clrMapOvr>
   <p:extLst mod="1">
     <p:ext uri="{DCECCB84-F9BA-43D5-87BE-67443E8EF086}">
-      <p15:sldGuideLst xmlns:p15="http://schemas.microsoft.com/office/powerpoint/2012/main"/>
+      <p15:sldGuideLst xmlns:p15="http://schemas.microsoft.com/office/powerpoint/2012/main" xmlns=""/>
     </p:ext>
   </p:extLst>
 </p:sldLayout>
@@ -3869,7 +3870,7 @@
           <a:p>
             <a:fld id="{9334D819-9F07-4261-B09B-9E467E5D9002}" type="datetimeFigureOut">
               <a:rPr lang="en-US" dirty="0"/>
-              <a:t>10/18/2017</a:t>
+              <a:t>11/13/17</a:t>
             </a:fld>
             <a:endParaRPr lang="en-US" dirty="0"/>
           </a:p>
@@ -3959,7 +3960,7 @@
           <a:p>
             <a:fld id="{9334D819-9F07-4261-B09B-9E467E5D9002}" type="datetimeFigureOut">
               <a:rPr lang="en-US" dirty="0"/>
-              <a:t>10/18/2017</a:t>
+              <a:t>11/13/17</a:t>
             </a:fld>
             <a:endParaRPr lang="en-US" dirty="0"/>
           </a:p>
@@ -4717,7 +4718,7 @@
           <a:p>
             <a:fld id="{9334D819-9F07-4261-B09B-9E467E5D9002}" type="datetimeFigureOut">
               <a:rPr lang="en-US" dirty="0"/>
-              <a:t>10/18/2017</a:t>
+              <a:t>11/13/17</a:t>
             </a:fld>
             <a:endParaRPr lang="en-US" dirty="0"/>
           </a:p>
@@ -4820,7 +4821,7 @@
   </p:clrMapOvr>
   <p:extLst mod="1">
     <p:ext uri="{DCECCB84-F9BA-43D5-87BE-67443E8EF086}">
-      <p15:sldGuideLst xmlns:p15="http://schemas.microsoft.com/office/powerpoint/2012/main">
+      <p15:sldGuideLst xmlns:p15="http://schemas.microsoft.com/office/powerpoint/2012/main" xmlns="">
         <p15:guide id="1" orient="horz" pos="696">
           <p15:clr>
             <a:srgbClr val="FBAE40"/>
@@ -5552,7 +5553,7 @@
           <a:p>
             <a:fld id="{9334D819-9F07-4261-B09B-9E467E5D9002}" type="datetimeFigureOut">
               <a:rPr lang="en-US" dirty="0"/>
-              <a:t>10/18/2017</a:t>
+              <a:t>11/13/17</a:t>
             </a:fld>
             <a:endParaRPr lang="en-US" dirty="0"/>
           </a:p>
@@ -5775,7 +5776,7 @@
             <a:fld id="{9334D819-9F07-4261-B09B-9E467E5D9002}" type="datetimeFigureOut">
               <a:rPr lang="en-US" dirty="0"/>
               <a:pPr/>
-              <a:t>10/18/2017</a:t>
+              <a:t>11/13/17</a:t>
             </a:fld>
             <a:endParaRPr lang="en-US" dirty="0"/>
           </a:p>
@@ -6716,7 +6717,7 @@
   </p:txStyles>
   <p:extLst mod="1">
     <p:ext uri="{27BBF7A9-308A-43DC-89C8-2F10F3537804}">
-      <p15:sldGuideLst xmlns:p15="http://schemas.microsoft.com/office/powerpoint/2012/main">
+      <p15:sldGuideLst xmlns:p15="http://schemas.microsoft.com/office/powerpoint/2012/main" xmlns="">
         <p15:guide id="1" pos="792">
           <p15:clr>
             <a:srgbClr val="F26B43"/>
@@ -6775,7 +6776,7 @@
           <p:cNvPr id="2" name="Title 1">
             <a:extLst>
               <a:ext uri="{FF2B5EF4-FFF2-40B4-BE49-F238E27FC236}">
-                <a16:creationId xmlns:a16="http://schemas.microsoft.com/office/drawing/2014/main" id="{C6199E7C-29B1-46E2-9136-E11F1AE90A09}"/>
+                <a16:creationId xmlns:a16="http://schemas.microsoft.com/office/drawing/2014/main" xmlns="" id="{C6199E7C-29B1-46E2-9136-E11F1AE90A09}"/>
               </a:ext>
             </a:extLst>
           </p:cNvPr>
@@ -6803,7 +6804,7 @@
           <p:cNvPr id="3" name="Subtitle 2">
             <a:extLst>
               <a:ext uri="{FF2B5EF4-FFF2-40B4-BE49-F238E27FC236}">
-                <a16:creationId xmlns:a16="http://schemas.microsoft.com/office/drawing/2014/main" id="{CFC1C688-3386-4BA0-94F2-AB0AA5D503E4}"/>
+                <a16:creationId xmlns:a16="http://schemas.microsoft.com/office/drawing/2014/main" xmlns="" id="{CFC1C688-3386-4BA0-94F2-AB0AA5D503E4}"/>
               </a:ext>
             </a:extLst>
           </p:cNvPr>
@@ -6841,6 +6842,13 @@
   <p:clrMapOvr>
     <a:masterClrMapping/>
   </p:clrMapOvr>
+  <p:timing>
+    <p:tnLst>
+      <p:par>
+        <p:cTn xmlns:p14="http://schemas.microsoft.com/office/powerpoint/2010/main" id="1" dur="indefinite" restart="never" nodeType="tmRoot"/>
+      </p:par>
+    </p:tnLst>
+  </p:timing>
 </p:sld>
 </file>
 
@@ -6863,13 +6871,7 @@
       </p:grpSpPr>
       <p:sp>
         <p:nvSpPr>
-          <p:cNvPr id="2" name="Title 1">
-            <a:extLst>
-              <a:ext uri="{FF2B5EF4-FFF2-40B4-BE49-F238E27FC236}">
-                <a16:creationId xmlns:a16="http://schemas.microsoft.com/office/drawing/2014/main" id="{5ABBF08F-2582-4E09-8D8C-7775E33B85AD}"/>
-              </a:ext>
-            </a:extLst>
-          </p:cNvPr>
+          <p:cNvPr id="2" name="Title 1"/>
           <p:cNvSpPr>
             <a:spLocks noGrp="1"/>
           </p:cNvSpPr>
@@ -6877,131 +6879,146 @@
             <p:ph type="title"/>
           </p:nvPr>
         </p:nvSpPr>
-        <p:spPr>
-          <a:xfrm>
-            <a:off x="269507" y="544665"/>
-            <a:ext cx="7137133" cy="1196671"/>
-          </a:xfrm>
-        </p:spPr>
+        <p:spPr/>
         <p:txBody>
-          <a:bodyPr>
-            <a:normAutofit/>
-          </a:bodyPr>
+          <a:bodyPr/>
           <a:lstStyle/>
           <a:p>
-            <a:pPr algn="ctr"/>
-            <a:r>
-              <a:rPr lang="en-US" sz="5400" dirty="0"/>
-              <a:t>MODEL</a:t>
-            </a:r>
+            <a:r>
+              <a:rPr lang="en-US" dirty="0" smtClean="0"/>
+              <a:t>Sprint 3 editions</a:t>
+            </a:r>
+            <a:endParaRPr lang="en-US" dirty="0"/>
           </a:p>
         </p:txBody>
       </p:sp>
       <p:sp>
         <p:nvSpPr>
-          <p:cNvPr id="4" name="Text Placeholder 3">
-            <a:extLst>
-              <a:ext uri="{FF2B5EF4-FFF2-40B4-BE49-F238E27FC236}">
-                <a16:creationId xmlns:a16="http://schemas.microsoft.com/office/drawing/2014/main" id="{9AEA9920-571F-42E4-A389-F16775334A8C}"/>
-              </a:ext>
-            </a:extLst>
-          </p:cNvPr>
+          <p:cNvPr id="3" name="Content Placeholder 2"/>
           <p:cNvSpPr>
             <a:spLocks noGrp="1"/>
           </p:cNvSpPr>
           <p:nvPr>
-            <p:ph type="body" sz="half" idx="2"/>
+            <p:ph sz="half" idx="1"/>
           </p:nvPr>
         </p:nvSpPr>
-        <p:spPr>
-          <a:xfrm>
-            <a:off x="2292015" y="2001218"/>
-            <a:ext cx="3092115" cy="4164164"/>
-          </a:xfrm>
-        </p:spPr>
+        <p:spPr/>
         <p:txBody>
           <a:bodyPr>
-            <a:normAutofit/>
+            <a:noAutofit/>
           </a:bodyPr>
           <a:lstStyle/>
           <a:p>
-            <a:pPr algn="ctr"/>
-            <a:r>
-              <a:rPr lang="en-US" sz="2800" u="sng" dirty="0">
-                <a:solidFill>
-                  <a:schemeClr val="tx1"/>
-                </a:solidFill>
-              </a:rPr>
-              <a:t>MAIN CLASSES</a:t>
-            </a:r>
-          </a:p>
-          <a:p>
-            <a:pPr algn="ctr"/>
-            <a:r>
-              <a:rPr lang="en-US" sz="2000" dirty="0">
-                <a:solidFill>
-                  <a:schemeClr val="tx1"/>
-                </a:solidFill>
-              </a:rPr>
-              <a:t>Account</a:t>
-            </a:r>
-          </a:p>
-          <a:p>
-            <a:pPr algn="ctr"/>
-            <a:r>
-              <a:rPr lang="en-US" sz="2000" dirty="0">
-                <a:solidFill>
-                  <a:schemeClr val="tx1"/>
-                </a:solidFill>
-              </a:rPr>
-              <a:t>Transaction</a:t>
-            </a:r>
-          </a:p>
-          <a:p>
-            <a:pPr algn="ctr"/>
-            <a:r>
-              <a:rPr lang="en-US" sz="2000" dirty="0">
-                <a:solidFill>
-                  <a:schemeClr val="tx1"/>
-                </a:solidFill>
-              </a:rPr>
-              <a:t>Withdrawal</a:t>
-            </a:r>
-          </a:p>
-          <a:p>
-            <a:pPr algn="ctr"/>
-            <a:r>
-              <a:rPr lang="en-US" sz="2000" dirty="0">
-                <a:solidFill>
-                  <a:schemeClr val="tx1"/>
-                </a:solidFill>
-              </a:rPr>
-              <a:t>Deposit</a:t>
-            </a:r>
-          </a:p>
-          <a:p>
-            <a:pPr algn="ctr"/>
-            <a:r>
-              <a:rPr lang="en-US" sz="1800" dirty="0">
-                <a:solidFill>
-                  <a:schemeClr val="tx1"/>
-                </a:solidFill>
-              </a:rPr>
-              <a:t>(Not in code yet)</a:t>
-            </a:r>
+            <a:r>
+              <a:rPr lang="en-US" sz="2800" dirty="0" smtClean="0"/>
+              <a:t>New Credit Card or Check Format</a:t>
+            </a:r>
+          </a:p>
+          <a:p>
+            <a:r>
+              <a:rPr lang="en-US" sz="2800" dirty="0" smtClean="0"/>
+              <a:t>Password Protection</a:t>
+            </a:r>
+          </a:p>
+          <a:p>
+            <a:r>
+              <a:rPr lang="en-US" sz="2800" dirty="0" smtClean="0"/>
+              <a:t>Dropdown Menu for View Account</a:t>
+            </a:r>
+          </a:p>
+          <a:p>
+            <a:pPr lvl="1"/>
+            <a:r>
+              <a:rPr lang="en-US" sz="2800" dirty="0" smtClean="0"/>
+              <a:t>To be implemented as well for the account choice on withdrawal and deposit</a:t>
+            </a:r>
+          </a:p>
+          <a:p>
+            <a:pPr marL="457200" lvl="1" indent="0">
+              <a:buNone/>
+            </a:pPr>
+            <a:endParaRPr lang="en-US" sz="2800" dirty="0" smtClean="0"/>
+          </a:p>
+        </p:txBody>
+      </p:sp>
+      <p:sp>
+        <p:nvSpPr>
+          <p:cNvPr id="4" name="Content Placeholder 3"/>
+          <p:cNvSpPr>
+            <a:spLocks noGrp="1"/>
+          </p:cNvSpPr>
+          <p:nvPr>
+            <p:ph sz="half" idx="2"/>
+          </p:nvPr>
+        </p:nvSpPr>
+        <p:spPr/>
+        <p:txBody>
+          <a:bodyPr>
+            <a:normAutofit lnSpcReduction="10000"/>
+          </a:bodyPr>
+          <a:lstStyle/>
+          <a:p>
+            <a:r>
+              <a:rPr lang="en-US" sz="2800" dirty="0" smtClean="0"/>
+              <a:t>Logo Creation &amp; Implementation</a:t>
+            </a:r>
+          </a:p>
+          <a:p>
+            <a:r>
+              <a:rPr lang="en-US" sz="2800" dirty="0" smtClean="0"/>
+              <a:t>Expense Codes for Deposits</a:t>
+            </a:r>
+          </a:p>
+          <a:p>
+            <a:pPr lvl="1"/>
+            <a:r>
+              <a:rPr lang="en-US" sz="2800" dirty="0" smtClean="0"/>
+              <a:t>Dropdown menu as well</a:t>
+            </a:r>
+          </a:p>
+          <a:p>
+            <a:r>
+              <a:rPr lang="en-US" sz="2800" dirty="0"/>
+              <a:t>Main Account Implementation</a:t>
+            </a:r>
+          </a:p>
+          <a:p>
+            <a:pPr lvl="1"/>
+            <a:r>
+              <a:rPr lang="en-US" sz="2800" dirty="0"/>
+              <a:t>Everything subtracted and added from and </a:t>
+            </a:r>
+            <a:r>
+              <a:rPr lang="en-US" sz="2800" dirty="0" smtClean="0"/>
+              <a:t>to</a:t>
+            </a:r>
+            <a:endParaRPr lang="en-US" sz="2800" dirty="0"/>
+          </a:p>
+          <a:p>
+            <a:pPr marL="457200" lvl="1" indent="0">
+              <a:buNone/>
+            </a:pPr>
+            <a:endParaRPr lang="en-US" dirty="0"/>
           </a:p>
         </p:txBody>
       </p:sp>
     </p:spTree>
     <p:extLst>
       <p:ext uri="{BB962C8B-B14F-4D97-AF65-F5344CB8AC3E}">
-        <p14:creationId xmlns:p14="http://schemas.microsoft.com/office/powerpoint/2010/main" val="919915019"/>
+        <p14:creationId xmlns:p14="http://schemas.microsoft.com/office/powerpoint/2010/main" val="3292244348"/>
       </p:ext>
     </p:extLst>
   </p:cSld>
   <p:clrMapOvr>
     <a:masterClrMapping/>
   </p:clrMapOvr>
+  <p:timing>
+    <p:tnLst>
+      <p:par>
+        <p:cTn xmlns:p14="http://schemas.microsoft.com/office/powerpoint/2010/main" id="1" dur="indefinite" restart="never" nodeType="tmRoot"/>
+      </p:par>
+    </p:tnLst>
+  </p:timing>
 </p:sld>
 </file>
 
@@ -7027,7 +7044,175 @@
           <p:cNvPr id="2" name="Title 1">
             <a:extLst>
               <a:ext uri="{FF2B5EF4-FFF2-40B4-BE49-F238E27FC236}">
-                <a16:creationId xmlns:a16="http://schemas.microsoft.com/office/drawing/2014/main" id="{4DF97F2A-1C61-45E1-8FFA-D92E98296125}"/>
+                <a16:creationId xmlns:a16="http://schemas.microsoft.com/office/drawing/2014/main" xmlns="" id="{5ABBF08F-2582-4E09-8D8C-7775E33B85AD}"/>
+              </a:ext>
+            </a:extLst>
+          </p:cNvPr>
+          <p:cNvSpPr>
+            <a:spLocks noGrp="1"/>
+          </p:cNvSpPr>
+          <p:nvPr>
+            <p:ph type="title"/>
+          </p:nvPr>
+        </p:nvSpPr>
+        <p:spPr>
+          <a:xfrm>
+            <a:off x="269507" y="544665"/>
+            <a:ext cx="7137133" cy="1196671"/>
+          </a:xfrm>
+        </p:spPr>
+        <p:txBody>
+          <a:bodyPr>
+            <a:normAutofit/>
+          </a:bodyPr>
+          <a:lstStyle/>
+          <a:p>
+            <a:pPr algn="ctr"/>
+            <a:r>
+              <a:rPr lang="en-US" sz="5400" dirty="0"/>
+              <a:t>MODEL</a:t>
+            </a:r>
+          </a:p>
+        </p:txBody>
+      </p:sp>
+      <p:sp>
+        <p:nvSpPr>
+          <p:cNvPr id="4" name="Text Placeholder 3">
+            <a:extLst>
+              <a:ext uri="{FF2B5EF4-FFF2-40B4-BE49-F238E27FC236}">
+                <a16:creationId xmlns:a16="http://schemas.microsoft.com/office/drawing/2014/main" xmlns="" id="{9AEA9920-571F-42E4-A389-F16775334A8C}"/>
+              </a:ext>
+            </a:extLst>
+          </p:cNvPr>
+          <p:cNvSpPr>
+            <a:spLocks noGrp="1"/>
+          </p:cNvSpPr>
+          <p:nvPr>
+            <p:ph type="body" sz="half" idx="2"/>
+          </p:nvPr>
+        </p:nvSpPr>
+        <p:spPr>
+          <a:xfrm>
+            <a:off x="2292015" y="2001218"/>
+            <a:ext cx="3092115" cy="4164164"/>
+          </a:xfrm>
+        </p:spPr>
+        <p:txBody>
+          <a:bodyPr>
+            <a:normAutofit/>
+          </a:bodyPr>
+          <a:lstStyle/>
+          <a:p>
+            <a:pPr algn="ctr"/>
+            <a:r>
+              <a:rPr lang="en-US" sz="2800" u="sng" dirty="0">
+                <a:solidFill>
+                  <a:schemeClr val="tx1"/>
+                </a:solidFill>
+              </a:rPr>
+              <a:t>MAIN CLASSES</a:t>
+            </a:r>
+          </a:p>
+          <a:p>
+            <a:pPr algn="ctr"/>
+            <a:r>
+              <a:rPr lang="en-US" sz="2000" dirty="0">
+                <a:solidFill>
+                  <a:schemeClr val="tx1"/>
+                </a:solidFill>
+              </a:rPr>
+              <a:t>Account</a:t>
+            </a:r>
+          </a:p>
+          <a:p>
+            <a:pPr algn="ctr"/>
+            <a:r>
+              <a:rPr lang="en-US" sz="2000" dirty="0">
+                <a:solidFill>
+                  <a:schemeClr val="tx1"/>
+                </a:solidFill>
+              </a:rPr>
+              <a:t>Transaction</a:t>
+            </a:r>
+          </a:p>
+          <a:p>
+            <a:pPr algn="ctr"/>
+            <a:r>
+              <a:rPr lang="en-US" sz="2000" dirty="0">
+                <a:solidFill>
+                  <a:schemeClr val="tx1"/>
+                </a:solidFill>
+              </a:rPr>
+              <a:t>Withdrawal</a:t>
+            </a:r>
+          </a:p>
+          <a:p>
+            <a:pPr algn="ctr"/>
+            <a:r>
+              <a:rPr lang="en-US" sz="2000" dirty="0">
+                <a:solidFill>
+                  <a:schemeClr val="tx1"/>
+                </a:solidFill>
+              </a:rPr>
+              <a:t>Deposit</a:t>
+            </a:r>
+          </a:p>
+          <a:p>
+            <a:pPr algn="ctr"/>
+            <a:r>
+              <a:rPr lang="en-US" sz="1800" dirty="0">
+                <a:solidFill>
+                  <a:schemeClr val="tx1"/>
+                </a:solidFill>
+              </a:rPr>
+              <a:t>(Not in code yet)</a:t>
+            </a:r>
+          </a:p>
+        </p:txBody>
+      </p:sp>
+    </p:spTree>
+    <p:extLst>
+      <p:ext uri="{BB962C8B-B14F-4D97-AF65-F5344CB8AC3E}">
+        <p14:creationId xmlns:p14="http://schemas.microsoft.com/office/powerpoint/2010/main" val="919915019"/>
+      </p:ext>
+    </p:extLst>
+  </p:cSld>
+  <p:clrMapOvr>
+    <a:masterClrMapping/>
+  </p:clrMapOvr>
+  <p:timing>
+    <p:tnLst>
+      <p:par>
+        <p:cTn xmlns:p14="http://schemas.microsoft.com/office/powerpoint/2010/main" id="1" dur="indefinite" restart="never" nodeType="tmRoot"/>
+      </p:par>
+    </p:tnLst>
+  </p:timing>
+</p:sld>
+</file>
+
+<file path=ppt/slides/slide4.xml><?xml version="1.0" encoding="utf-8"?>
+<p:sld xmlns:a="http://schemas.openxmlformats.org/drawingml/2006/main" xmlns:r="http://schemas.openxmlformats.org/officeDocument/2006/relationships" xmlns:p="http://schemas.openxmlformats.org/presentationml/2006/main">
+  <p:cSld>
+    <p:spTree>
+      <p:nvGrpSpPr>
+        <p:cNvPr id="1" name=""/>
+        <p:cNvGrpSpPr/>
+        <p:nvPr/>
+      </p:nvGrpSpPr>
+      <p:grpSpPr>
+        <a:xfrm>
+          <a:off x="0" y="0"/>
+          <a:ext cx="0" cy="0"/>
+          <a:chOff x="0" y="0"/>
+          <a:chExt cx="0" cy="0"/>
+        </a:xfrm>
+      </p:grpSpPr>
+      <p:sp>
+        <p:nvSpPr>
+          <p:cNvPr id="2" name="Title 1">
+            <a:extLst>
+              <a:ext uri="{FF2B5EF4-FFF2-40B4-BE49-F238E27FC236}">
+                <a16:creationId xmlns:a16="http://schemas.microsoft.com/office/drawing/2014/main" xmlns="" id="{4DF97F2A-1C61-45E1-8FFA-D92E98296125}"/>
               </a:ext>
             </a:extLst>
           </p:cNvPr>
@@ -7063,7 +7248,7 @@
           <p:cNvPr id="6" name="Content Placeholder 5">
             <a:extLst>
               <a:ext uri="{FF2B5EF4-FFF2-40B4-BE49-F238E27FC236}">
-                <a16:creationId xmlns:a16="http://schemas.microsoft.com/office/drawing/2014/main" id="{03C4A6CB-7634-4530-9EBB-6ACE5D8A3AA0}"/>
+                <a16:creationId xmlns:a16="http://schemas.microsoft.com/office/drawing/2014/main" xmlns="" id="{03C4A6CB-7634-4530-9EBB-6ACE5D8A3AA0}"/>
               </a:ext>
             </a:extLst>
           </p:cNvPr>
@@ -7092,7 +7277,7 @@
           <p:cNvPr id="4" name="Text Placeholder 3">
             <a:extLst>
               <a:ext uri="{FF2B5EF4-FFF2-40B4-BE49-F238E27FC236}">
-                <a16:creationId xmlns:a16="http://schemas.microsoft.com/office/drawing/2014/main" id="{82CC2D71-93DE-4F5B-8654-108BE506A3A8}"/>
+                <a16:creationId xmlns:a16="http://schemas.microsoft.com/office/drawing/2014/main" xmlns="" id="{82CC2D71-93DE-4F5B-8654-108BE506A3A8}"/>
               </a:ext>
             </a:extLst>
           </p:cNvPr>
@@ -7174,7 +7359,7 @@
           <p:cNvPr id="11" name="TextBox 10">
             <a:extLst>
               <a:ext uri="{FF2B5EF4-FFF2-40B4-BE49-F238E27FC236}">
-                <a16:creationId xmlns:a16="http://schemas.microsoft.com/office/drawing/2014/main" id="{D05D7B08-C0DA-42C0-BAD3-9CB50D11CB19}"/>
+                <a16:creationId xmlns:a16="http://schemas.microsoft.com/office/drawing/2014/main" xmlns="" id="{D05D7B08-C0DA-42C0-BAD3-9CB50D11CB19}"/>
               </a:ext>
             </a:extLst>
           </p:cNvPr>
@@ -7209,7 +7394,7 @@
           <p:cNvPr id="13" name="Content Placeholder 5">
             <a:extLst>
               <a:ext uri="{FF2B5EF4-FFF2-40B4-BE49-F238E27FC236}">
-                <a16:creationId xmlns:a16="http://schemas.microsoft.com/office/drawing/2014/main" id="{8D5A2897-EA1C-4623-8782-C779B6686583}"/>
+                <a16:creationId xmlns:a16="http://schemas.microsoft.com/office/drawing/2014/main" xmlns="" id="{8D5A2897-EA1C-4623-8782-C779B6686583}"/>
               </a:ext>
             </a:extLst>
           </p:cNvPr>
@@ -7247,7 +7432,7 @@
 </p:sld>
 </file>
 
-<file path=ppt/slides/slide4.xml><?xml version="1.0" encoding="utf-8"?>
+<file path=ppt/slides/slide5.xml><?xml version="1.0" encoding="utf-8"?>
 <p:sld xmlns:a="http://schemas.openxmlformats.org/drawingml/2006/main" xmlns:r="http://schemas.openxmlformats.org/officeDocument/2006/relationships" xmlns:p="http://schemas.openxmlformats.org/presentationml/2006/main">
   <p:cSld>
     <p:spTree>
@@ -7269,7 +7454,7 @@
           <p:cNvPr id="2" name="Title 1">
             <a:extLst>
               <a:ext uri="{FF2B5EF4-FFF2-40B4-BE49-F238E27FC236}">
-                <a16:creationId xmlns:a16="http://schemas.microsoft.com/office/drawing/2014/main" id="{CAE6CE5C-0172-40BB-8ED4-66C6F6FE3A68}"/>
+                <a16:creationId xmlns:a16="http://schemas.microsoft.com/office/drawing/2014/main" xmlns="" id="{CAE6CE5C-0172-40BB-8ED4-66C6F6FE3A68}"/>
               </a:ext>
             </a:extLst>
           </p:cNvPr>
@@ -7300,7 +7485,7 @@
           <p:cNvPr id="6" name="Content Placeholder 5">
             <a:extLst>
               <a:ext uri="{FF2B5EF4-FFF2-40B4-BE49-F238E27FC236}">
-                <a16:creationId xmlns:a16="http://schemas.microsoft.com/office/drawing/2014/main" id="{0F89C3FC-69C7-44EB-B52F-97AFC9F0C0A6}"/>
+                <a16:creationId xmlns:a16="http://schemas.microsoft.com/office/drawing/2014/main" xmlns="" id="{0F89C3FC-69C7-44EB-B52F-97AFC9F0C0A6}"/>
               </a:ext>
             </a:extLst>
           </p:cNvPr>
@@ -7329,7 +7514,7 @@
           <p:cNvPr id="4" name="Text Placeholder 3">
             <a:extLst>
               <a:ext uri="{FF2B5EF4-FFF2-40B4-BE49-F238E27FC236}">
-                <a16:creationId xmlns:a16="http://schemas.microsoft.com/office/drawing/2014/main" id="{82EECC6E-BA75-4321-B49B-7DBAD34631F8}"/>
+                <a16:creationId xmlns:a16="http://schemas.microsoft.com/office/drawing/2014/main" xmlns="" id="{82EECC6E-BA75-4321-B49B-7DBAD34631F8}"/>
               </a:ext>
             </a:extLst>
           </p:cNvPr>
@@ -7434,7 +7619,7 @@
           <p:cNvPr id="7" name="TextBox 6">
             <a:extLst>
               <a:ext uri="{FF2B5EF4-FFF2-40B4-BE49-F238E27FC236}">
-                <a16:creationId xmlns:a16="http://schemas.microsoft.com/office/drawing/2014/main" id="{7A859ED5-2F86-4057-89E9-91F29A11A11D}"/>
+                <a16:creationId xmlns:a16="http://schemas.microsoft.com/office/drawing/2014/main" xmlns="" id="{7A859ED5-2F86-4057-89E9-91F29A11A11D}"/>
               </a:ext>
             </a:extLst>
           </p:cNvPr>
@@ -7477,7 +7662,7 @@
 </p:sld>
 </file>
 
-<file path=ppt/slides/slide5.xml><?xml version="1.0" encoding="utf-8"?>
+<file path=ppt/slides/slide6.xml><?xml version="1.0" encoding="utf-8"?>
 <p:sld xmlns:a="http://schemas.openxmlformats.org/drawingml/2006/main" xmlns:r="http://schemas.openxmlformats.org/officeDocument/2006/relationships" xmlns:p="http://schemas.openxmlformats.org/presentationml/2006/main">
   <p:cSld>
     <p:spTree>
@@ -7499,7 +7684,7 @@
           <p:cNvPr id="13" name="Arrow: Curved Right 12">
             <a:extLst>
               <a:ext uri="{FF2B5EF4-FFF2-40B4-BE49-F238E27FC236}">
-                <a16:creationId xmlns:a16="http://schemas.microsoft.com/office/drawing/2014/main" id="{9E8D8E94-1074-48E8-B571-F04AF75DF7FC}"/>
+                <a16:creationId xmlns:a16="http://schemas.microsoft.com/office/drawing/2014/main" xmlns="" id="{9E8D8E94-1074-48E8-B571-F04AF75DF7FC}"/>
               </a:ext>
             </a:extLst>
           </p:cNvPr>
@@ -7549,7 +7734,7 @@
           <p:cNvPr id="12" name="Arrow: Curved Left 11">
             <a:extLst>
               <a:ext uri="{FF2B5EF4-FFF2-40B4-BE49-F238E27FC236}">
-                <a16:creationId xmlns:a16="http://schemas.microsoft.com/office/drawing/2014/main" id="{CCEA8BB3-EFD5-4EDC-A58E-6F27AC9F44DC}"/>
+                <a16:creationId xmlns:a16="http://schemas.microsoft.com/office/drawing/2014/main" xmlns="" id="{CCEA8BB3-EFD5-4EDC-A58E-6F27AC9F44DC}"/>
               </a:ext>
             </a:extLst>
           </p:cNvPr>
@@ -7599,7 +7784,7 @@
           <p:cNvPr id="4" name="Rectangle: Rounded Corners 3">
             <a:extLst>
               <a:ext uri="{FF2B5EF4-FFF2-40B4-BE49-F238E27FC236}">
-                <a16:creationId xmlns:a16="http://schemas.microsoft.com/office/drawing/2014/main" id="{D34EBDAA-6E44-4CB0-9188-F0204E9EF15E}"/>
+                <a16:creationId xmlns:a16="http://schemas.microsoft.com/office/drawing/2014/main" xmlns="" id="{D34EBDAA-6E44-4CB0-9188-F0204E9EF15E}"/>
               </a:ext>
             </a:extLst>
           </p:cNvPr>
@@ -7666,7 +7851,7 @@
           <p:cNvPr id="5" name="Rectangle: Rounded Corners 4">
             <a:extLst>
               <a:ext uri="{FF2B5EF4-FFF2-40B4-BE49-F238E27FC236}">
-                <a16:creationId xmlns:a16="http://schemas.microsoft.com/office/drawing/2014/main" id="{5A069AE0-5359-47AE-9301-53690ECEBFDD}"/>
+                <a16:creationId xmlns:a16="http://schemas.microsoft.com/office/drawing/2014/main" xmlns="" id="{5A069AE0-5359-47AE-9301-53690ECEBFDD}"/>
               </a:ext>
             </a:extLst>
           </p:cNvPr>
@@ -7729,7 +7914,7 @@
           <p:cNvPr id="6" name="Rectangle: Rounded Corners 5">
             <a:extLst>
               <a:ext uri="{FF2B5EF4-FFF2-40B4-BE49-F238E27FC236}">
-                <a16:creationId xmlns:a16="http://schemas.microsoft.com/office/drawing/2014/main" id="{3A5E7BD6-B02F-4A84-A853-EFDA52B4C52F}"/>
+                <a16:creationId xmlns:a16="http://schemas.microsoft.com/office/drawing/2014/main" xmlns="" id="{3A5E7BD6-B02F-4A84-A853-EFDA52B4C52F}"/>
               </a:ext>
             </a:extLst>
           </p:cNvPr>
@@ -7792,7 +7977,7 @@
           <p:cNvPr id="9" name="Arrow: Up 8">
             <a:extLst>
               <a:ext uri="{FF2B5EF4-FFF2-40B4-BE49-F238E27FC236}">
-                <a16:creationId xmlns:a16="http://schemas.microsoft.com/office/drawing/2014/main" id="{2945D2A4-4237-4A37-A8C3-518DDF249A1C}"/>
+                <a16:creationId xmlns:a16="http://schemas.microsoft.com/office/drawing/2014/main" xmlns="" id="{2945D2A4-4237-4A37-A8C3-518DDF249A1C}"/>
               </a:ext>
             </a:extLst>
           </p:cNvPr>
@@ -7838,7 +8023,7 @@
           <p:cNvPr id="10" name="Arrow: Up 9">
             <a:extLst>
               <a:ext uri="{FF2B5EF4-FFF2-40B4-BE49-F238E27FC236}">
-                <a16:creationId xmlns:a16="http://schemas.microsoft.com/office/drawing/2014/main" id="{1CB8B7DB-8E8D-4B07-A9D4-D52BE6BC7360}"/>
+                <a16:creationId xmlns:a16="http://schemas.microsoft.com/office/drawing/2014/main" xmlns="" id="{1CB8B7DB-8E8D-4B07-A9D4-D52BE6BC7360}"/>
               </a:ext>
             </a:extLst>
           </p:cNvPr>
@@ -7884,7 +8069,7 @@
           <p:cNvPr id="14" name="TextBox 13">
             <a:extLst>
               <a:ext uri="{FF2B5EF4-FFF2-40B4-BE49-F238E27FC236}">
-                <a16:creationId xmlns:a16="http://schemas.microsoft.com/office/drawing/2014/main" id="{FAB8EF5F-1EDE-4EF7-92D0-70D11B73813A}"/>
+                <a16:creationId xmlns:a16="http://schemas.microsoft.com/office/drawing/2014/main" xmlns="" id="{FAB8EF5F-1EDE-4EF7-92D0-70D11B73813A}"/>
               </a:ext>
             </a:extLst>
           </p:cNvPr>
@@ -7975,7 +8160,7 @@
     </a:clrScheme>
     <a:fontScheme name="Badge">
       <a:majorFont>
-        <a:latin typeface="Impact" panose="020B0806030902050204"/>
+        <a:latin typeface="Impact"/>
         <a:ea typeface=""/>
         <a:cs typeface=""/>
         <a:font script="Jpan" typeface="メイリオ"/>
@@ -8010,7 +8195,7 @@
         <a:font script="Geor" typeface="Sylfaen"/>
       </a:majorFont>
       <a:minorFont>
-        <a:latin typeface="Gill Sans MT" panose="020B0502020104020203"/>
+        <a:latin typeface="Gill Sans MT"/>
         <a:ea typeface=""/>
         <a:cs typeface=""/>
         <a:font script="Grek" typeface="Corbel"/>
@@ -8186,7 +8371,7 @@
   <a:extraClrSchemeLst/>
   <a:extLst>
     <a:ext uri="{05A4C25C-085E-4340-85A3-A5531E510DB2}">
-      <thm15:themeFamily xmlns:thm15="http://schemas.microsoft.com/office/thememl/2012/main" name="Badge" id="{71A07785-5930-41D4-9A83-E23602B48E98}" vid="{771EA782-DFA6-45B1-AEA3-661F1715B310}"/>
+      <thm15:themeFamily xmlns:thm15="http://schemas.microsoft.com/office/thememl/2012/main" xmlns="" name="Badge" id="{71A07785-5930-41D4-9A83-E23602B48E98}" vid="{771EA782-DFA6-45B1-AEA3-661F1715B310}"/>
     </a:ext>
   </a:extLst>
 </a:theme>

</xml_diff>